<commit_message>
+ Finish paper pre
</commit_message>
<xml_diff>
--- a/final/papers/paper_pre_于泽汉.pptx
+++ b/final/papers/paper_pre_于泽汉.pptx
@@ -23,6 +23,11 @@
     <p:sldId id="272" r:id="rId17"/>
     <p:sldId id="274" r:id="rId18"/>
     <p:sldId id="275" r:id="rId19"/>
+    <p:sldId id="276" r:id="rId20"/>
+    <p:sldId id="277" r:id="rId21"/>
+    <p:sldId id="278" r:id="rId22"/>
+    <p:sldId id="279" r:id="rId23"/>
+    <p:sldId id="280" r:id="rId24"/>
   </p:sldIdLst>
   <p:sldSz cx="12192000" cy="6858000"/>
   <p:notesSz cx="6858000" cy="9144000"/>
@@ -151,7 +156,7 @@
           <p:cNvPr id="2" name="标题 1">
             <a:extLst>
               <a:ext uri="{FF2B5EF4-FFF2-40B4-BE49-F238E27FC236}">
-                <a16:creationId xmlns:a16="http://schemas.microsoft.com/office/drawing/2014/main" id="{EB22F48A-F894-4564-9FF5-D974CD1B2D5E}"/>
+                <a16:creationId xmlns="" xmlns:a16="http://schemas.microsoft.com/office/drawing/2014/main" id="{EB22F48A-F894-4564-9FF5-D974CD1B2D5E}"/>
               </a:ext>
             </a:extLst>
           </p:cNvPr>
@@ -188,7 +193,7 @@
           <p:cNvPr id="3" name="副标题 2">
             <a:extLst>
               <a:ext uri="{FF2B5EF4-FFF2-40B4-BE49-F238E27FC236}">
-                <a16:creationId xmlns:a16="http://schemas.microsoft.com/office/drawing/2014/main" id="{15D6B58A-9160-4021-9439-AE785B16C399}"/>
+                <a16:creationId xmlns="" xmlns:a16="http://schemas.microsoft.com/office/drawing/2014/main" id="{15D6B58A-9160-4021-9439-AE785B16C399}"/>
               </a:ext>
             </a:extLst>
           </p:cNvPr>
@@ -258,7 +263,7 @@
           <p:cNvPr id="4" name="日期占位符 3">
             <a:extLst>
               <a:ext uri="{FF2B5EF4-FFF2-40B4-BE49-F238E27FC236}">
-                <a16:creationId xmlns:a16="http://schemas.microsoft.com/office/drawing/2014/main" id="{AF0E3BC1-6269-46A3-AC5A-4C616DC3B52E}"/>
+                <a16:creationId xmlns="" xmlns:a16="http://schemas.microsoft.com/office/drawing/2014/main" id="{AF0E3BC1-6269-46A3-AC5A-4C616DC3B52E}"/>
               </a:ext>
             </a:extLst>
           </p:cNvPr>
@@ -287,7 +292,7 @@
           <p:cNvPr id="5" name="页脚占位符 4">
             <a:extLst>
               <a:ext uri="{FF2B5EF4-FFF2-40B4-BE49-F238E27FC236}">
-                <a16:creationId xmlns:a16="http://schemas.microsoft.com/office/drawing/2014/main" id="{590F0B42-6F40-4230-8CE8-33BA0859D953}"/>
+                <a16:creationId xmlns="" xmlns:a16="http://schemas.microsoft.com/office/drawing/2014/main" id="{590F0B42-6F40-4230-8CE8-33BA0859D953}"/>
               </a:ext>
             </a:extLst>
           </p:cNvPr>
@@ -312,7 +317,7 @@
           <p:cNvPr id="6" name="灯片编号占位符 5">
             <a:extLst>
               <a:ext uri="{FF2B5EF4-FFF2-40B4-BE49-F238E27FC236}">
-                <a16:creationId xmlns:a16="http://schemas.microsoft.com/office/drawing/2014/main" id="{11BA0C20-124C-4C89-8258-F6243220602F}"/>
+                <a16:creationId xmlns="" xmlns:a16="http://schemas.microsoft.com/office/drawing/2014/main" id="{11BA0C20-124C-4C89-8258-F6243220602F}"/>
               </a:ext>
             </a:extLst>
           </p:cNvPr>
@@ -371,7 +376,7 @@
           <p:cNvPr id="2" name="标题 1">
             <a:extLst>
               <a:ext uri="{FF2B5EF4-FFF2-40B4-BE49-F238E27FC236}">
-                <a16:creationId xmlns:a16="http://schemas.microsoft.com/office/drawing/2014/main" id="{9B98FF47-E909-4528-8FDB-8AAF0E904C2B}"/>
+                <a16:creationId xmlns="" xmlns:a16="http://schemas.microsoft.com/office/drawing/2014/main" id="{9B98FF47-E909-4528-8FDB-8AAF0E904C2B}"/>
               </a:ext>
             </a:extLst>
           </p:cNvPr>
@@ -399,7 +404,7 @@
           <p:cNvPr id="3" name="竖排文字占位符 2">
             <a:extLst>
               <a:ext uri="{FF2B5EF4-FFF2-40B4-BE49-F238E27FC236}">
-                <a16:creationId xmlns:a16="http://schemas.microsoft.com/office/drawing/2014/main" id="{D75B758D-74D9-40FB-BB6B-2FF3B091DA56}"/>
+                <a16:creationId xmlns="" xmlns:a16="http://schemas.microsoft.com/office/drawing/2014/main" id="{D75B758D-74D9-40FB-BB6B-2FF3B091DA56}"/>
               </a:ext>
             </a:extLst>
           </p:cNvPr>
@@ -456,7 +461,7 @@
           <p:cNvPr id="4" name="日期占位符 3">
             <a:extLst>
               <a:ext uri="{FF2B5EF4-FFF2-40B4-BE49-F238E27FC236}">
-                <a16:creationId xmlns:a16="http://schemas.microsoft.com/office/drawing/2014/main" id="{8D6B4650-EB48-4E7C-9F39-AD8D7F6121F5}"/>
+                <a16:creationId xmlns="" xmlns:a16="http://schemas.microsoft.com/office/drawing/2014/main" id="{8D6B4650-EB48-4E7C-9F39-AD8D7F6121F5}"/>
               </a:ext>
             </a:extLst>
           </p:cNvPr>
@@ -485,7 +490,7 @@
           <p:cNvPr id="5" name="页脚占位符 4">
             <a:extLst>
               <a:ext uri="{FF2B5EF4-FFF2-40B4-BE49-F238E27FC236}">
-                <a16:creationId xmlns:a16="http://schemas.microsoft.com/office/drawing/2014/main" id="{D6F44DEB-4802-41C8-898C-9C799775E2C1}"/>
+                <a16:creationId xmlns="" xmlns:a16="http://schemas.microsoft.com/office/drawing/2014/main" id="{D6F44DEB-4802-41C8-898C-9C799775E2C1}"/>
               </a:ext>
             </a:extLst>
           </p:cNvPr>
@@ -510,7 +515,7 @@
           <p:cNvPr id="6" name="灯片编号占位符 5">
             <a:extLst>
               <a:ext uri="{FF2B5EF4-FFF2-40B4-BE49-F238E27FC236}">
-                <a16:creationId xmlns:a16="http://schemas.microsoft.com/office/drawing/2014/main" id="{D90DE64E-116A-4E61-BE34-2137E3B2CBC0}"/>
+                <a16:creationId xmlns="" xmlns:a16="http://schemas.microsoft.com/office/drawing/2014/main" id="{D90DE64E-116A-4E61-BE34-2137E3B2CBC0}"/>
               </a:ext>
             </a:extLst>
           </p:cNvPr>
@@ -569,7 +574,7 @@
           <p:cNvPr id="2" name="竖排标题 1">
             <a:extLst>
               <a:ext uri="{FF2B5EF4-FFF2-40B4-BE49-F238E27FC236}">
-                <a16:creationId xmlns:a16="http://schemas.microsoft.com/office/drawing/2014/main" id="{46ED32F6-E2F0-4030-86D4-80F2321E7AA8}"/>
+                <a16:creationId xmlns="" xmlns:a16="http://schemas.microsoft.com/office/drawing/2014/main" id="{46ED32F6-E2F0-4030-86D4-80F2321E7AA8}"/>
               </a:ext>
             </a:extLst>
           </p:cNvPr>
@@ -602,7 +607,7 @@
           <p:cNvPr id="3" name="竖排文字占位符 2">
             <a:extLst>
               <a:ext uri="{FF2B5EF4-FFF2-40B4-BE49-F238E27FC236}">
-                <a16:creationId xmlns:a16="http://schemas.microsoft.com/office/drawing/2014/main" id="{2101B5FE-056D-4B22-858B-76DC13BAB43A}"/>
+                <a16:creationId xmlns="" xmlns:a16="http://schemas.microsoft.com/office/drawing/2014/main" id="{2101B5FE-056D-4B22-858B-76DC13BAB43A}"/>
               </a:ext>
             </a:extLst>
           </p:cNvPr>
@@ -664,7 +669,7 @@
           <p:cNvPr id="4" name="日期占位符 3">
             <a:extLst>
               <a:ext uri="{FF2B5EF4-FFF2-40B4-BE49-F238E27FC236}">
-                <a16:creationId xmlns:a16="http://schemas.microsoft.com/office/drawing/2014/main" id="{9FE6DCFF-D7EB-4F9D-A94B-56F901A44F5D}"/>
+                <a16:creationId xmlns="" xmlns:a16="http://schemas.microsoft.com/office/drawing/2014/main" id="{9FE6DCFF-D7EB-4F9D-A94B-56F901A44F5D}"/>
               </a:ext>
             </a:extLst>
           </p:cNvPr>
@@ -693,7 +698,7 @@
           <p:cNvPr id="5" name="页脚占位符 4">
             <a:extLst>
               <a:ext uri="{FF2B5EF4-FFF2-40B4-BE49-F238E27FC236}">
-                <a16:creationId xmlns:a16="http://schemas.microsoft.com/office/drawing/2014/main" id="{06F3EEEA-70BC-4C35-BAD6-073DB02D673F}"/>
+                <a16:creationId xmlns="" xmlns:a16="http://schemas.microsoft.com/office/drawing/2014/main" id="{06F3EEEA-70BC-4C35-BAD6-073DB02D673F}"/>
               </a:ext>
             </a:extLst>
           </p:cNvPr>
@@ -718,7 +723,7 @@
           <p:cNvPr id="6" name="灯片编号占位符 5">
             <a:extLst>
               <a:ext uri="{FF2B5EF4-FFF2-40B4-BE49-F238E27FC236}">
-                <a16:creationId xmlns:a16="http://schemas.microsoft.com/office/drawing/2014/main" id="{F7944933-74EA-4406-8863-79DE09E8044C}"/>
+                <a16:creationId xmlns="" xmlns:a16="http://schemas.microsoft.com/office/drawing/2014/main" id="{F7944933-74EA-4406-8863-79DE09E8044C}"/>
               </a:ext>
             </a:extLst>
           </p:cNvPr>
@@ -777,7 +782,7 @@
           <p:cNvPr id="2" name="标题 1">
             <a:extLst>
               <a:ext uri="{FF2B5EF4-FFF2-40B4-BE49-F238E27FC236}">
-                <a16:creationId xmlns:a16="http://schemas.microsoft.com/office/drawing/2014/main" id="{5FED7110-1B61-44E7-BCF0-29583491363A}"/>
+                <a16:creationId xmlns="" xmlns:a16="http://schemas.microsoft.com/office/drawing/2014/main" id="{5FED7110-1B61-44E7-BCF0-29583491363A}"/>
               </a:ext>
             </a:extLst>
           </p:cNvPr>
@@ -819,7 +824,7 @@
           <p:cNvPr id="3" name="内容占位符 2">
             <a:extLst>
               <a:ext uri="{FF2B5EF4-FFF2-40B4-BE49-F238E27FC236}">
-                <a16:creationId xmlns:a16="http://schemas.microsoft.com/office/drawing/2014/main" id="{49325157-6755-484D-A55A-A49120800F23}"/>
+                <a16:creationId xmlns="" xmlns:a16="http://schemas.microsoft.com/office/drawing/2014/main" id="{49325157-6755-484D-A55A-A49120800F23}"/>
               </a:ext>
             </a:extLst>
           </p:cNvPr>
@@ -914,7 +919,7 @@
           <p:cNvPr id="4" name="日期占位符 3">
             <a:extLst>
               <a:ext uri="{FF2B5EF4-FFF2-40B4-BE49-F238E27FC236}">
-                <a16:creationId xmlns:a16="http://schemas.microsoft.com/office/drawing/2014/main" id="{FB0BFE1A-99C1-4C72-AB8F-BF024F33DEC1}"/>
+                <a16:creationId xmlns="" xmlns:a16="http://schemas.microsoft.com/office/drawing/2014/main" id="{FB0BFE1A-99C1-4C72-AB8F-BF024F33DEC1}"/>
               </a:ext>
             </a:extLst>
           </p:cNvPr>
@@ -943,7 +948,7 @@
           <p:cNvPr id="5" name="页脚占位符 4">
             <a:extLst>
               <a:ext uri="{FF2B5EF4-FFF2-40B4-BE49-F238E27FC236}">
-                <a16:creationId xmlns:a16="http://schemas.microsoft.com/office/drawing/2014/main" id="{B64D290B-32B3-49F3-B373-A1761E873ECC}"/>
+                <a16:creationId xmlns="" xmlns:a16="http://schemas.microsoft.com/office/drawing/2014/main" id="{B64D290B-32B3-49F3-B373-A1761E873ECC}"/>
               </a:ext>
             </a:extLst>
           </p:cNvPr>
@@ -968,7 +973,7 @@
           <p:cNvPr id="6" name="灯片编号占位符 5">
             <a:extLst>
               <a:ext uri="{FF2B5EF4-FFF2-40B4-BE49-F238E27FC236}">
-                <a16:creationId xmlns:a16="http://schemas.microsoft.com/office/drawing/2014/main" id="{160FE912-83C1-47C9-A3BC-BD34C205D79F}"/>
+                <a16:creationId xmlns="" xmlns:a16="http://schemas.microsoft.com/office/drawing/2014/main" id="{160FE912-83C1-47C9-A3BC-BD34C205D79F}"/>
               </a:ext>
             </a:extLst>
           </p:cNvPr>
@@ -1027,7 +1032,7 @@
           <p:cNvPr id="2" name="标题 1">
             <a:extLst>
               <a:ext uri="{FF2B5EF4-FFF2-40B4-BE49-F238E27FC236}">
-                <a16:creationId xmlns:a16="http://schemas.microsoft.com/office/drawing/2014/main" id="{FB7BAC8E-F602-4422-8E2D-2B1F8F9BAD93}"/>
+                <a16:creationId xmlns="" xmlns:a16="http://schemas.microsoft.com/office/drawing/2014/main" id="{FB7BAC8E-F602-4422-8E2D-2B1F8F9BAD93}"/>
               </a:ext>
             </a:extLst>
           </p:cNvPr>
@@ -1064,7 +1069,7 @@
           <p:cNvPr id="3" name="文本占位符 2">
             <a:extLst>
               <a:ext uri="{FF2B5EF4-FFF2-40B4-BE49-F238E27FC236}">
-                <a16:creationId xmlns:a16="http://schemas.microsoft.com/office/drawing/2014/main" id="{CA445856-49AF-4B85-A36F-9E6F4B2CDC11}"/>
+                <a16:creationId xmlns="" xmlns:a16="http://schemas.microsoft.com/office/drawing/2014/main" id="{CA445856-49AF-4B85-A36F-9E6F4B2CDC11}"/>
               </a:ext>
             </a:extLst>
           </p:cNvPr>
@@ -1189,7 +1194,7 @@
           <p:cNvPr id="4" name="日期占位符 3">
             <a:extLst>
               <a:ext uri="{FF2B5EF4-FFF2-40B4-BE49-F238E27FC236}">
-                <a16:creationId xmlns:a16="http://schemas.microsoft.com/office/drawing/2014/main" id="{631A0E14-7725-44B4-89FA-DB535C44E548}"/>
+                <a16:creationId xmlns="" xmlns:a16="http://schemas.microsoft.com/office/drawing/2014/main" id="{631A0E14-7725-44B4-89FA-DB535C44E548}"/>
               </a:ext>
             </a:extLst>
           </p:cNvPr>
@@ -1218,7 +1223,7 @@
           <p:cNvPr id="5" name="页脚占位符 4">
             <a:extLst>
               <a:ext uri="{FF2B5EF4-FFF2-40B4-BE49-F238E27FC236}">
-                <a16:creationId xmlns:a16="http://schemas.microsoft.com/office/drawing/2014/main" id="{790EE4CC-5D80-4D11-8A73-9602D0C16836}"/>
+                <a16:creationId xmlns="" xmlns:a16="http://schemas.microsoft.com/office/drawing/2014/main" id="{790EE4CC-5D80-4D11-8A73-9602D0C16836}"/>
               </a:ext>
             </a:extLst>
           </p:cNvPr>
@@ -1243,7 +1248,7 @@
           <p:cNvPr id="6" name="灯片编号占位符 5">
             <a:extLst>
               <a:ext uri="{FF2B5EF4-FFF2-40B4-BE49-F238E27FC236}">
-                <a16:creationId xmlns:a16="http://schemas.microsoft.com/office/drawing/2014/main" id="{26A187E6-7346-4559-A611-47F163EB2134}"/>
+                <a16:creationId xmlns="" xmlns:a16="http://schemas.microsoft.com/office/drawing/2014/main" id="{26A187E6-7346-4559-A611-47F163EB2134}"/>
               </a:ext>
             </a:extLst>
           </p:cNvPr>
@@ -1302,7 +1307,7 @@
           <p:cNvPr id="2" name="标题 1">
             <a:extLst>
               <a:ext uri="{FF2B5EF4-FFF2-40B4-BE49-F238E27FC236}">
-                <a16:creationId xmlns:a16="http://schemas.microsoft.com/office/drawing/2014/main" id="{953EAA69-6474-4609-8F33-18CDCF758765}"/>
+                <a16:creationId xmlns="" xmlns:a16="http://schemas.microsoft.com/office/drawing/2014/main" id="{953EAA69-6474-4609-8F33-18CDCF758765}"/>
               </a:ext>
             </a:extLst>
           </p:cNvPr>
@@ -1330,7 +1335,7 @@
           <p:cNvPr id="3" name="内容占位符 2">
             <a:extLst>
               <a:ext uri="{FF2B5EF4-FFF2-40B4-BE49-F238E27FC236}">
-                <a16:creationId xmlns:a16="http://schemas.microsoft.com/office/drawing/2014/main" id="{201A8DDD-FD7A-4FCF-8D69-05100FEF0A34}"/>
+                <a16:creationId xmlns="" xmlns:a16="http://schemas.microsoft.com/office/drawing/2014/main" id="{201A8DDD-FD7A-4FCF-8D69-05100FEF0A34}"/>
               </a:ext>
             </a:extLst>
           </p:cNvPr>
@@ -1392,7 +1397,7 @@
           <p:cNvPr id="4" name="内容占位符 3">
             <a:extLst>
               <a:ext uri="{FF2B5EF4-FFF2-40B4-BE49-F238E27FC236}">
-                <a16:creationId xmlns:a16="http://schemas.microsoft.com/office/drawing/2014/main" id="{6EA94DD5-7DB5-454E-8072-29EF496F0528}"/>
+                <a16:creationId xmlns="" xmlns:a16="http://schemas.microsoft.com/office/drawing/2014/main" id="{6EA94DD5-7DB5-454E-8072-29EF496F0528}"/>
               </a:ext>
             </a:extLst>
           </p:cNvPr>
@@ -1454,7 +1459,7 @@
           <p:cNvPr id="5" name="日期占位符 4">
             <a:extLst>
               <a:ext uri="{FF2B5EF4-FFF2-40B4-BE49-F238E27FC236}">
-                <a16:creationId xmlns:a16="http://schemas.microsoft.com/office/drawing/2014/main" id="{96289FC1-0C60-4ECD-919F-76291231FEF2}"/>
+                <a16:creationId xmlns="" xmlns:a16="http://schemas.microsoft.com/office/drawing/2014/main" id="{96289FC1-0C60-4ECD-919F-76291231FEF2}"/>
               </a:ext>
             </a:extLst>
           </p:cNvPr>
@@ -1483,7 +1488,7 @@
           <p:cNvPr id="6" name="页脚占位符 5">
             <a:extLst>
               <a:ext uri="{FF2B5EF4-FFF2-40B4-BE49-F238E27FC236}">
-                <a16:creationId xmlns:a16="http://schemas.microsoft.com/office/drawing/2014/main" id="{222F0FCD-4134-42C0-B87D-AF608485AC73}"/>
+                <a16:creationId xmlns="" xmlns:a16="http://schemas.microsoft.com/office/drawing/2014/main" id="{222F0FCD-4134-42C0-B87D-AF608485AC73}"/>
               </a:ext>
             </a:extLst>
           </p:cNvPr>
@@ -1508,7 +1513,7 @@
           <p:cNvPr id="7" name="灯片编号占位符 6">
             <a:extLst>
               <a:ext uri="{FF2B5EF4-FFF2-40B4-BE49-F238E27FC236}">
-                <a16:creationId xmlns:a16="http://schemas.microsoft.com/office/drawing/2014/main" id="{D2BF5873-C8D2-48B0-B362-A61E8CAFEA52}"/>
+                <a16:creationId xmlns="" xmlns:a16="http://schemas.microsoft.com/office/drawing/2014/main" id="{D2BF5873-C8D2-48B0-B362-A61E8CAFEA52}"/>
               </a:ext>
             </a:extLst>
           </p:cNvPr>
@@ -1567,7 +1572,7 @@
           <p:cNvPr id="2" name="标题 1">
             <a:extLst>
               <a:ext uri="{FF2B5EF4-FFF2-40B4-BE49-F238E27FC236}">
-                <a16:creationId xmlns:a16="http://schemas.microsoft.com/office/drawing/2014/main" id="{26BE3989-AD87-40A3-8E10-7471E342804E}"/>
+                <a16:creationId xmlns="" xmlns:a16="http://schemas.microsoft.com/office/drawing/2014/main" id="{26BE3989-AD87-40A3-8E10-7471E342804E}"/>
               </a:ext>
             </a:extLst>
           </p:cNvPr>
@@ -1600,7 +1605,7 @@
           <p:cNvPr id="3" name="文本占位符 2">
             <a:extLst>
               <a:ext uri="{FF2B5EF4-FFF2-40B4-BE49-F238E27FC236}">
-                <a16:creationId xmlns:a16="http://schemas.microsoft.com/office/drawing/2014/main" id="{F20075C3-CC78-45D9-9A99-5B6463C963E4}"/>
+                <a16:creationId xmlns="" xmlns:a16="http://schemas.microsoft.com/office/drawing/2014/main" id="{F20075C3-CC78-45D9-9A99-5B6463C963E4}"/>
               </a:ext>
             </a:extLst>
           </p:cNvPr>
@@ -1671,7 +1676,7 @@
           <p:cNvPr id="4" name="内容占位符 3">
             <a:extLst>
               <a:ext uri="{FF2B5EF4-FFF2-40B4-BE49-F238E27FC236}">
-                <a16:creationId xmlns:a16="http://schemas.microsoft.com/office/drawing/2014/main" id="{D1D6FBA0-5668-45F5-842E-775C0D5EBCBA}"/>
+                <a16:creationId xmlns="" xmlns:a16="http://schemas.microsoft.com/office/drawing/2014/main" id="{D1D6FBA0-5668-45F5-842E-775C0D5EBCBA}"/>
               </a:ext>
             </a:extLst>
           </p:cNvPr>
@@ -1733,7 +1738,7 @@
           <p:cNvPr id="5" name="文本占位符 4">
             <a:extLst>
               <a:ext uri="{FF2B5EF4-FFF2-40B4-BE49-F238E27FC236}">
-                <a16:creationId xmlns:a16="http://schemas.microsoft.com/office/drawing/2014/main" id="{ACBA3589-96F4-464C-9EBD-C9AFD6EEACFA}"/>
+                <a16:creationId xmlns="" xmlns:a16="http://schemas.microsoft.com/office/drawing/2014/main" id="{ACBA3589-96F4-464C-9EBD-C9AFD6EEACFA}"/>
               </a:ext>
             </a:extLst>
           </p:cNvPr>
@@ -1804,7 +1809,7 @@
           <p:cNvPr id="6" name="内容占位符 5">
             <a:extLst>
               <a:ext uri="{FF2B5EF4-FFF2-40B4-BE49-F238E27FC236}">
-                <a16:creationId xmlns:a16="http://schemas.microsoft.com/office/drawing/2014/main" id="{C02D188A-9563-4825-B9BB-C7BB3900C43D}"/>
+                <a16:creationId xmlns="" xmlns:a16="http://schemas.microsoft.com/office/drawing/2014/main" id="{C02D188A-9563-4825-B9BB-C7BB3900C43D}"/>
               </a:ext>
             </a:extLst>
           </p:cNvPr>
@@ -1866,7 +1871,7 @@
           <p:cNvPr id="7" name="日期占位符 6">
             <a:extLst>
               <a:ext uri="{FF2B5EF4-FFF2-40B4-BE49-F238E27FC236}">
-                <a16:creationId xmlns:a16="http://schemas.microsoft.com/office/drawing/2014/main" id="{76C1E974-CF8A-4DD0-B5EB-61B058F4B28F}"/>
+                <a16:creationId xmlns="" xmlns:a16="http://schemas.microsoft.com/office/drawing/2014/main" id="{76C1E974-CF8A-4DD0-B5EB-61B058F4B28F}"/>
               </a:ext>
             </a:extLst>
           </p:cNvPr>
@@ -1895,7 +1900,7 @@
           <p:cNvPr id="8" name="页脚占位符 7">
             <a:extLst>
               <a:ext uri="{FF2B5EF4-FFF2-40B4-BE49-F238E27FC236}">
-                <a16:creationId xmlns:a16="http://schemas.microsoft.com/office/drawing/2014/main" id="{C63B1585-7FFD-40F6-A51E-34FC9EE64115}"/>
+                <a16:creationId xmlns="" xmlns:a16="http://schemas.microsoft.com/office/drawing/2014/main" id="{C63B1585-7FFD-40F6-A51E-34FC9EE64115}"/>
               </a:ext>
             </a:extLst>
           </p:cNvPr>
@@ -1920,7 +1925,7 @@
           <p:cNvPr id="9" name="灯片编号占位符 8">
             <a:extLst>
               <a:ext uri="{FF2B5EF4-FFF2-40B4-BE49-F238E27FC236}">
-                <a16:creationId xmlns:a16="http://schemas.microsoft.com/office/drawing/2014/main" id="{D77BA297-F6E6-4F77-88D7-7ADC21C63D38}"/>
+                <a16:creationId xmlns="" xmlns:a16="http://schemas.microsoft.com/office/drawing/2014/main" id="{D77BA297-F6E6-4F77-88D7-7ADC21C63D38}"/>
               </a:ext>
             </a:extLst>
           </p:cNvPr>
@@ -1979,7 +1984,7 @@
           <p:cNvPr id="2" name="标题 1">
             <a:extLst>
               <a:ext uri="{FF2B5EF4-FFF2-40B4-BE49-F238E27FC236}">
-                <a16:creationId xmlns:a16="http://schemas.microsoft.com/office/drawing/2014/main" id="{E6941788-4D98-4804-AF69-B304B82A86BC}"/>
+                <a16:creationId xmlns="" xmlns:a16="http://schemas.microsoft.com/office/drawing/2014/main" id="{E6941788-4D98-4804-AF69-B304B82A86BC}"/>
               </a:ext>
             </a:extLst>
           </p:cNvPr>
@@ -2007,7 +2012,7 @@
           <p:cNvPr id="3" name="日期占位符 2">
             <a:extLst>
               <a:ext uri="{FF2B5EF4-FFF2-40B4-BE49-F238E27FC236}">
-                <a16:creationId xmlns:a16="http://schemas.microsoft.com/office/drawing/2014/main" id="{B3A67C53-29D8-4D29-90A6-E5B1A6A21D02}"/>
+                <a16:creationId xmlns="" xmlns:a16="http://schemas.microsoft.com/office/drawing/2014/main" id="{B3A67C53-29D8-4D29-90A6-E5B1A6A21D02}"/>
               </a:ext>
             </a:extLst>
           </p:cNvPr>
@@ -2036,7 +2041,7 @@
           <p:cNvPr id="4" name="页脚占位符 3">
             <a:extLst>
               <a:ext uri="{FF2B5EF4-FFF2-40B4-BE49-F238E27FC236}">
-                <a16:creationId xmlns:a16="http://schemas.microsoft.com/office/drawing/2014/main" id="{F503FF17-003B-441C-8BC7-6804ECD9861E}"/>
+                <a16:creationId xmlns="" xmlns:a16="http://schemas.microsoft.com/office/drawing/2014/main" id="{F503FF17-003B-441C-8BC7-6804ECD9861E}"/>
               </a:ext>
             </a:extLst>
           </p:cNvPr>
@@ -2061,7 +2066,7 @@
           <p:cNvPr id="5" name="灯片编号占位符 4">
             <a:extLst>
               <a:ext uri="{FF2B5EF4-FFF2-40B4-BE49-F238E27FC236}">
-                <a16:creationId xmlns:a16="http://schemas.microsoft.com/office/drawing/2014/main" id="{583D82F6-3729-4BE0-B34F-FA3DF3E6FE57}"/>
+                <a16:creationId xmlns="" xmlns:a16="http://schemas.microsoft.com/office/drawing/2014/main" id="{583D82F6-3729-4BE0-B34F-FA3DF3E6FE57}"/>
               </a:ext>
             </a:extLst>
           </p:cNvPr>
@@ -2120,7 +2125,7 @@
           <p:cNvPr id="2" name="日期占位符 1">
             <a:extLst>
               <a:ext uri="{FF2B5EF4-FFF2-40B4-BE49-F238E27FC236}">
-                <a16:creationId xmlns:a16="http://schemas.microsoft.com/office/drawing/2014/main" id="{214D635D-58FE-426E-B97E-5DFEC33091A0}"/>
+                <a16:creationId xmlns="" xmlns:a16="http://schemas.microsoft.com/office/drawing/2014/main" id="{214D635D-58FE-426E-B97E-5DFEC33091A0}"/>
               </a:ext>
             </a:extLst>
           </p:cNvPr>
@@ -2149,7 +2154,7 @@
           <p:cNvPr id="3" name="页脚占位符 2">
             <a:extLst>
               <a:ext uri="{FF2B5EF4-FFF2-40B4-BE49-F238E27FC236}">
-                <a16:creationId xmlns:a16="http://schemas.microsoft.com/office/drawing/2014/main" id="{ACF8DD8E-CCBA-43BE-9D75-44CD43B6B2D4}"/>
+                <a16:creationId xmlns="" xmlns:a16="http://schemas.microsoft.com/office/drawing/2014/main" id="{ACF8DD8E-CCBA-43BE-9D75-44CD43B6B2D4}"/>
               </a:ext>
             </a:extLst>
           </p:cNvPr>
@@ -2174,7 +2179,7 @@
           <p:cNvPr id="4" name="灯片编号占位符 3">
             <a:extLst>
               <a:ext uri="{FF2B5EF4-FFF2-40B4-BE49-F238E27FC236}">
-                <a16:creationId xmlns:a16="http://schemas.microsoft.com/office/drawing/2014/main" id="{46417A8A-7757-4DA4-8F36-823D22EAC955}"/>
+                <a16:creationId xmlns="" xmlns:a16="http://schemas.microsoft.com/office/drawing/2014/main" id="{46417A8A-7757-4DA4-8F36-823D22EAC955}"/>
               </a:ext>
             </a:extLst>
           </p:cNvPr>
@@ -2233,7 +2238,7 @@
           <p:cNvPr id="2" name="标题 1">
             <a:extLst>
               <a:ext uri="{FF2B5EF4-FFF2-40B4-BE49-F238E27FC236}">
-                <a16:creationId xmlns:a16="http://schemas.microsoft.com/office/drawing/2014/main" id="{C30540A2-98EA-4C7E-B3B1-4CA2634BE8A1}"/>
+                <a16:creationId xmlns="" xmlns:a16="http://schemas.microsoft.com/office/drawing/2014/main" id="{C30540A2-98EA-4C7E-B3B1-4CA2634BE8A1}"/>
               </a:ext>
             </a:extLst>
           </p:cNvPr>
@@ -2270,7 +2275,7 @@
           <p:cNvPr id="3" name="内容占位符 2">
             <a:extLst>
               <a:ext uri="{FF2B5EF4-FFF2-40B4-BE49-F238E27FC236}">
-                <a16:creationId xmlns:a16="http://schemas.microsoft.com/office/drawing/2014/main" id="{80679386-926A-45D7-AF40-B8ABEE82C7AA}"/>
+                <a16:creationId xmlns="" xmlns:a16="http://schemas.microsoft.com/office/drawing/2014/main" id="{80679386-926A-45D7-AF40-B8ABEE82C7AA}"/>
               </a:ext>
             </a:extLst>
           </p:cNvPr>
@@ -2360,7 +2365,7 @@
           <p:cNvPr id="4" name="文本占位符 3">
             <a:extLst>
               <a:ext uri="{FF2B5EF4-FFF2-40B4-BE49-F238E27FC236}">
-                <a16:creationId xmlns:a16="http://schemas.microsoft.com/office/drawing/2014/main" id="{CE784F95-F48A-469F-8E06-E8BD46A0EB96}"/>
+                <a16:creationId xmlns="" xmlns:a16="http://schemas.microsoft.com/office/drawing/2014/main" id="{CE784F95-F48A-469F-8E06-E8BD46A0EB96}"/>
               </a:ext>
             </a:extLst>
           </p:cNvPr>
@@ -2431,7 +2436,7 @@
           <p:cNvPr id="5" name="日期占位符 4">
             <a:extLst>
               <a:ext uri="{FF2B5EF4-FFF2-40B4-BE49-F238E27FC236}">
-                <a16:creationId xmlns:a16="http://schemas.microsoft.com/office/drawing/2014/main" id="{87F9F0B0-116B-49EB-B76A-7B2C697C0696}"/>
+                <a16:creationId xmlns="" xmlns:a16="http://schemas.microsoft.com/office/drawing/2014/main" id="{87F9F0B0-116B-49EB-B76A-7B2C697C0696}"/>
               </a:ext>
             </a:extLst>
           </p:cNvPr>
@@ -2460,7 +2465,7 @@
           <p:cNvPr id="6" name="页脚占位符 5">
             <a:extLst>
               <a:ext uri="{FF2B5EF4-FFF2-40B4-BE49-F238E27FC236}">
-                <a16:creationId xmlns:a16="http://schemas.microsoft.com/office/drawing/2014/main" id="{AA65E8A6-6EC1-4995-942C-6A0DC973F55A}"/>
+                <a16:creationId xmlns="" xmlns:a16="http://schemas.microsoft.com/office/drawing/2014/main" id="{AA65E8A6-6EC1-4995-942C-6A0DC973F55A}"/>
               </a:ext>
             </a:extLst>
           </p:cNvPr>
@@ -2485,7 +2490,7 @@
           <p:cNvPr id="7" name="灯片编号占位符 6">
             <a:extLst>
               <a:ext uri="{FF2B5EF4-FFF2-40B4-BE49-F238E27FC236}">
-                <a16:creationId xmlns:a16="http://schemas.microsoft.com/office/drawing/2014/main" id="{8620812D-51E4-4A11-A61F-F1C95C9D6B9F}"/>
+                <a16:creationId xmlns="" xmlns:a16="http://schemas.microsoft.com/office/drawing/2014/main" id="{8620812D-51E4-4A11-A61F-F1C95C9D6B9F}"/>
               </a:ext>
             </a:extLst>
           </p:cNvPr>
@@ -2544,7 +2549,7 @@
           <p:cNvPr id="2" name="标题 1">
             <a:extLst>
               <a:ext uri="{FF2B5EF4-FFF2-40B4-BE49-F238E27FC236}">
-                <a16:creationId xmlns:a16="http://schemas.microsoft.com/office/drawing/2014/main" id="{5277775D-D7C0-401A-A5DE-183CCC093BEC}"/>
+                <a16:creationId xmlns="" xmlns:a16="http://schemas.microsoft.com/office/drawing/2014/main" id="{5277775D-D7C0-401A-A5DE-183CCC093BEC}"/>
               </a:ext>
             </a:extLst>
           </p:cNvPr>
@@ -2581,7 +2586,7 @@
           <p:cNvPr id="3" name="图片占位符 2">
             <a:extLst>
               <a:ext uri="{FF2B5EF4-FFF2-40B4-BE49-F238E27FC236}">
-                <a16:creationId xmlns:a16="http://schemas.microsoft.com/office/drawing/2014/main" id="{0C21847E-83DE-4767-A980-6844DEF5F8AB}"/>
+                <a16:creationId xmlns="" xmlns:a16="http://schemas.microsoft.com/office/drawing/2014/main" id="{0C21847E-83DE-4767-A980-6844DEF5F8AB}"/>
               </a:ext>
             </a:extLst>
           </p:cNvPr>
@@ -2648,7 +2653,7 @@
           <p:cNvPr id="4" name="文本占位符 3">
             <a:extLst>
               <a:ext uri="{FF2B5EF4-FFF2-40B4-BE49-F238E27FC236}">
-                <a16:creationId xmlns:a16="http://schemas.microsoft.com/office/drawing/2014/main" id="{219F0B41-2A27-4E86-9784-D7068F47EF93}"/>
+                <a16:creationId xmlns="" xmlns:a16="http://schemas.microsoft.com/office/drawing/2014/main" id="{219F0B41-2A27-4E86-9784-D7068F47EF93}"/>
               </a:ext>
             </a:extLst>
           </p:cNvPr>
@@ -2719,7 +2724,7 @@
           <p:cNvPr id="5" name="日期占位符 4">
             <a:extLst>
               <a:ext uri="{FF2B5EF4-FFF2-40B4-BE49-F238E27FC236}">
-                <a16:creationId xmlns:a16="http://schemas.microsoft.com/office/drawing/2014/main" id="{31A233DD-B6BD-4FB2-8A51-7FE8ECE005D7}"/>
+                <a16:creationId xmlns="" xmlns:a16="http://schemas.microsoft.com/office/drawing/2014/main" id="{31A233DD-B6BD-4FB2-8A51-7FE8ECE005D7}"/>
               </a:ext>
             </a:extLst>
           </p:cNvPr>
@@ -2748,7 +2753,7 @@
           <p:cNvPr id="6" name="页脚占位符 5">
             <a:extLst>
               <a:ext uri="{FF2B5EF4-FFF2-40B4-BE49-F238E27FC236}">
-                <a16:creationId xmlns:a16="http://schemas.microsoft.com/office/drawing/2014/main" id="{AA139389-FFE0-4913-BAC7-16424F268071}"/>
+                <a16:creationId xmlns="" xmlns:a16="http://schemas.microsoft.com/office/drawing/2014/main" id="{AA139389-FFE0-4913-BAC7-16424F268071}"/>
               </a:ext>
             </a:extLst>
           </p:cNvPr>
@@ -2773,7 +2778,7 @@
           <p:cNvPr id="7" name="灯片编号占位符 6">
             <a:extLst>
               <a:ext uri="{FF2B5EF4-FFF2-40B4-BE49-F238E27FC236}">
-                <a16:creationId xmlns:a16="http://schemas.microsoft.com/office/drawing/2014/main" id="{EBE64213-90A3-4F4E-9086-84E3A86AF461}"/>
+                <a16:creationId xmlns="" xmlns:a16="http://schemas.microsoft.com/office/drawing/2014/main" id="{EBE64213-90A3-4F4E-9086-84E3A86AF461}"/>
               </a:ext>
             </a:extLst>
           </p:cNvPr>
@@ -2837,7 +2842,7 @@
           <p:cNvPr id="2" name="标题占位符 1">
             <a:extLst>
               <a:ext uri="{FF2B5EF4-FFF2-40B4-BE49-F238E27FC236}">
-                <a16:creationId xmlns:a16="http://schemas.microsoft.com/office/drawing/2014/main" id="{2133CA92-0702-4730-BAC0-4884FB0AB109}"/>
+                <a16:creationId xmlns="" xmlns:a16="http://schemas.microsoft.com/office/drawing/2014/main" id="{2133CA92-0702-4730-BAC0-4884FB0AB109}"/>
               </a:ext>
             </a:extLst>
           </p:cNvPr>
@@ -2875,7 +2880,7 @@
           <p:cNvPr id="3" name="文本占位符 2">
             <a:extLst>
               <a:ext uri="{FF2B5EF4-FFF2-40B4-BE49-F238E27FC236}">
-                <a16:creationId xmlns:a16="http://schemas.microsoft.com/office/drawing/2014/main" id="{1297C4C1-327E-4192-A51A-5EC1DB3DEA2A}"/>
+                <a16:creationId xmlns="" xmlns:a16="http://schemas.microsoft.com/office/drawing/2014/main" id="{1297C4C1-327E-4192-A51A-5EC1DB3DEA2A}"/>
               </a:ext>
             </a:extLst>
           </p:cNvPr>
@@ -2942,7 +2947,7 @@
           <p:cNvPr id="4" name="日期占位符 3">
             <a:extLst>
               <a:ext uri="{FF2B5EF4-FFF2-40B4-BE49-F238E27FC236}">
-                <a16:creationId xmlns:a16="http://schemas.microsoft.com/office/drawing/2014/main" id="{BA746941-A129-4FF9-AF52-EA2F5F972EA9}"/>
+                <a16:creationId xmlns="" xmlns:a16="http://schemas.microsoft.com/office/drawing/2014/main" id="{BA746941-A129-4FF9-AF52-EA2F5F972EA9}"/>
               </a:ext>
             </a:extLst>
           </p:cNvPr>
@@ -2989,7 +2994,7 @@
           <p:cNvPr id="5" name="页脚占位符 4">
             <a:extLst>
               <a:ext uri="{FF2B5EF4-FFF2-40B4-BE49-F238E27FC236}">
-                <a16:creationId xmlns:a16="http://schemas.microsoft.com/office/drawing/2014/main" id="{ABBB95C9-28DB-43DF-AAF8-1924A4F3E184}"/>
+                <a16:creationId xmlns="" xmlns:a16="http://schemas.microsoft.com/office/drawing/2014/main" id="{ABBB95C9-28DB-43DF-AAF8-1924A4F3E184}"/>
               </a:ext>
             </a:extLst>
           </p:cNvPr>
@@ -3032,7 +3037,7 @@
           <p:cNvPr id="6" name="灯片编号占位符 5">
             <a:extLst>
               <a:ext uri="{FF2B5EF4-FFF2-40B4-BE49-F238E27FC236}">
-                <a16:creationId xmlns:a16="http://schemas.microsoft.com/office/drawing/2014/main" id="{0E7DFD8E-A669-4435-8BD0-68E5EAB0B7CD}"/>
+                <a16:creationId xmlns="" xmlns:a16="http://schemas.microsoft.com/office/drawing/2014/main" id="{0E7DFD8E-A669-4435-8BD0-68E5EAB0B7CD}"/>
               </a:ext>
             </a:extLst>
           </p:cNvPr>
@@ -3400,7 +3405,7 @@
           <p:cNvPr id="4" name="文本框 3">
             <a:extLst>
               <a:ext uri="{FF2B5EF4-FFF2-40B4-BE49-F238E27FC236}">
-                <a16:creationId xmlns:a16="http://schemas.microsoft.com/office/drawing/2014/main" id="{97E9BAE3-5E3B-40C8-B740-683B64C4EC1A}"/>
+                <a16:creationId xmlns="" xmlns:a16="http://schemas.microsoft.com/office/drawing/2014/main" id="{97E9BAE3-5E3B-40C8-B740-683B64C4EC1A}"/>
               </a:ext>
             </a:extLst>
           </p:cNvPr>
@@ -3443,7 +3448,7 @@
           <p:cNvPr id="6" name="图片 5">
             <a:extLst>
               <a:ext uri="{FF2B5EF4-FFF2-40B4-BE49-F238E27FC236}">
-                <a16:creationId xmlns:a16="http://schemas.microsoft.com/office/drawing/2014/main" id="{1FEF6445-8824-4D3B-B11A-49AA46715E79}"/>
+                <a16:creationId xmlns="" xmlns:a16="http://schemas.microsoft.com/office/drawing/2014/main" id="{1FEF6445-8824-4D3B-B11A-49AA46715E79}"/>
               </a:ext>
             </a:extLst>
           </p:cNvPr>
@@ -3479,7 +3484,7 @@
           <p:cNvPr id="8" name="图片 7">
             <a:extLst>
               <a:ext uri="{FF2B5EF4-FFF2-40B4-BE49-F238E27FC236}">
-                <a16:creationId xmlns:a16="http://schemas.microsoft.com/office/drawing/2014/main" id="{092E6110-2A81-4290-AEBA-BCF0E22A3A02}"/>
+                <a16:creationId xmlns="" xmlns:a16="http://schemas.microsoft.com/office/drawing/2014/main" id="{092E6110-2A81-4290-AEBA-BCF0E22A3A02}"/>
               </a:ext>
             </a:extLst>
           </p:cNvPr>
@@ -3515,7 +3520,7 @@
           <p:cNvPr id="9" name="文本框 8">
             <a:extLst>
               <a:ext uri="{FF2B5EF4-FFF2-40B4-BE49-F238E27FC236}">
-                <a16:creationId xmlns:a16="http://schemas.microsoft.com/office/drawing/2014/main" id="{54B6DF35-A5CB-4C66-A5B2-67ED59DFBE66}"/>
+                <a16:creationId xmlns="" xmlns:a16="http://schemas.microsoft.com/office/drawing/2014/main" id="{54B6DF35-A5CB-4C66-A5B2-67ED59DFBE66}"/>
               </a:ext>
             </a:extLst>
           </p:cNvPr>
@@ -3558,7 +3563,7 @@
           <p:cNvPr id="10" name="文本框 9">
             <a:extLst>
               <a:ext uri="{FF2B5EF4-FFF2-40B4-BE49-F238E27FC236}">
-                <a16:creationId xmlns:a16="http://schemas.microsoft.com/office/drawing/2014/main" id="{6F96174D-98DF-4226-9D2F-D688BDC41B07}"/>
+                <a16:creationId xmlns="" xmlns:a16="http://schemas.microsoft.com/office/drawing/2014/main" id="{6F96174D-98DF-4226-9D2F-D688BDC41B07}"/>
               </a:ext>
             </a:extLst>
           </p:cNvPr>
@@ -3603,6 +3608,13 @@
   <p:clrMapOvr>
     <a:masterClrMapping/>
   </p:clrMapOvr>
+  <p:timing>
+    <p:tnLst>
+      <p:par>
+        <p:cTn id="1" dur="indefinite" restart="never" nodeType="tmRoot"/>
+      </p:par>
+    </p:tnLst>
+  </p:timing>
 </p:sld>
 </file>
 
@@ -3628,7 +3640,7 @@
           <p:cNvPr id="2" name="标题 1">
             <a:extLst>
               <a:ext uri="{FF2B5EF4-FFF2-40B4-BE49-F238E27FC236}">
-                <a16:creationId xmlns:a16="http://schemas.microsoft.com/office/drawing/2014/main" id="{633E8602-9780-4A14-8364-360D978606FE}"/>
+                <a16:creationId xmlns="" xmlns:a16="http://schemas.microsoft.com/office/drawing/2014/main" id="{633E8602-9780-4A14-8364-360D978606FE}"/>
               </a:ext>
             </a:extLst>
           </p:cNvPr>
@@ -3657,7 +3669,7 @@
           <p:cNvPr id="3" name="内容占位符 2">
             <a:extLst>
               <a:ext uri="{FF2B5EF4-FFF2-40B4-BE49-F238E27FC236}">
-                <a16:creationId xmlns:a16="http://schemas.microsoft.com/office/drawing/2014/main" id="{9E713E19-4F1A-4551-8934-9C7F4F365F00}"/>
+                <a16:creationId xmlns="" xmlns:a16="http://schemas.microsoft.com/office/drawing/2014/main" id="{9E713E19-4F1A-4551-8934-9C7F4F365F00}"/>
               </a:ext>
             </a:extLst>
           </p:cNvPr>
@@ -3694,7 +3706,7 @@
           <p:cNvPr id="5" name="图片 4">
             <a:extLst>
               <a:ext uri="{FF2B5EF4-FFF2-40B4-BE49-F238E27FC236}">
-                <a16:creationId xmlns:a16="http://schemas.microsoft.com/office/drawing/2014/main" id="{E69BC4BD-586A-4A86-8EC4-9B6FBA15C870}"/>
+                <a16:creationId xmlns="" xmlns:a16="http://schemas.microsoft.com/office/drawing/2014/main" id="{E69BC4BD-586A-4A86-8EC4-9B6FBA15C870}"/>
               </a:ext>
             </a:extLst>
           </p:cNvPr>
@@ -3735,6 +3747,13 @@
   <p:clrMapOvr>
     <a:masterClrMapping/>
   </p:clrMapOvr>
+  <p:timing>
+    <p:tnLst>
+      <p:par>
+        <p:cTn id="1" dur="indefinite" restart="never" nodeType="tmRoot"/>
+      </p:par>
+    </p:tnLst>
+  </p:timing>
 </p:sld>
 </file>
 
@@ -3760,7 +3779,7 @@
           <p:cNvPr id="7" name="图片 6">
             <a:extLst>
               <a:ext uri="{FF2B5EF4-FFF2-40B4-BE49-F238E27FC236}">
-                <a16:creationId xmlns:a16="http://schemas.microsoft.com/office/drawing/2014/main" id="{2002500E-DC57-4768-8643-6658532724DA}"/>
+                <a16:creationId xmlns="" xmlns:a16="http://schemas.microsoft.com/office/drawing/2014/main" id="{2002500E-DC57-4768-8643-6658532724DA}"/>
               </a:ext>
             </a:extLst>
           </p:cNvPr>
@@ -3796,7 +3815,7 @@
           <p:cNvPr id="2" name="标题 1">
             <a:extLst>
               <a:ext uri="{FF2B5EF4-FFF2-40B4-BE49-F238E27FC236}">
-                <a16:creationId xmlns:a16="http://schemas.microsoft.com/office/drawing/2014/main" id="{40949340-1DD0-4BFF-96F3-C457F4DBCA03}"/>
+                <a16:creationId xmlns="" xmlns:a16="http://schemas.microsoft.com/office/drawing/2014/main" id="{40949340-1DD0-4BFF-96F3-C457F4DBCA03}"/>
               </a:ext>
             </a:extLst>
           </p:cNvPr>
@@ -3825,7 +3844,7 @@
           <p:cNvPr id="3" name="内容占位符 2">
             <a:extLst>
               <a:ext uri="{FF2B5EF4-FFF2-40B4-BE49-F238E27FC236}">
-                <a16:creationId xmlns:a16="http://schemas.microsoft.com/office/drawing/2014/main" id="{B65CC8A1-7303-4A29-BD7C-2DB51AB01909}"/>
+                <a16:creationId xmlns="" xmlns:a16="http://schemas.microsoft.com/office/drawing/2014/main" id="{B65CC8A1-7303-4A29-BD7C-2DB51AB01909}"/>
               </a:ext>
             </a:extLst>
           </p:cNvPr>
@@ -3899,6 +3918,13 @@
   <p:clrMapOvr>
     <a:masterClrMapping/>
   </p:clrMapOvr>
+  <p:timing>
+    <p:tnLst>
+      <p:par>
+        <p:cTn id="1" dur="indefinite" restart="never" nodeType="tmRoot"/>
+      </p:par>
+    </p:tnLst>
+  </p:timing>
 </p:sld>
 </file>
 
@@ -3924,7 +3950,7 @@
           <p:cNvPr id="2" name="标题 1">
             <a:extLst>
               <a:ext uri="{FF2B5EF4-FFF2-40B4-BE49-F238E27FC236}">
-                <a16:creationId xmlns:a16="http://schemas.microsoft.com/office/drawing/2014/main" id="{C4AC2E05-A989-44E6-855D-F8064E649972}"/>
+                <a16:creationId xmlns="" xmlns:a16="http://schemas.microsoft.com/office/drawing/2014/main" id="{C4AC2E05-A989-44E6-855D-F8064E649972}"/>
               </a:ext>
             </a:extLst>
           </p:cNvPr>
@@ -3953,7 +3979,7 @@
           <p:cNvPr id="3" name="内容占位符 2">
             <a:extLst>
               <a:ext uri="{FF2B5EF4-FFF2-40B4-BE49-F238E27FC236}">
-                <a16:creationId xmlns:a16="http://schemas.microsoft.com/office/drawing/2014/main" id="{CA2C4400-D3E4-4475-80B5-7BFB01D58176}"/>
+                <a16:creationId xmlns="" xmlns:a16="http://schemas.microsoft.com/office/drawing/2014/main" id="{CA2C4400-D3E4-4475-80B5-7BFB01D58176}"/>
               </a:ext>
             </a:extLst>
           </p:cNvPr>
@@ -4000,7 +4026,7 @@
           <p:cNvPr id="5" name="图片 4">
             <a:extLst>
               <a:ext uri="{FF2B5EF4-FFF2-40B4-BE49-F238E27FC236}">
-                <a16:creationId xmlns:a16="http://schemas.microsoft.com/office/drawing/2014/main" id="{63433E3C-4915-4257-AA11-CF37DAC18559}"/>
+                <a16:creationId xmlns="" xmlns:a16="http://schemas.microsoft.com/office/drawing/2014/main" id="{63433E3C-4915-4257-AA11-CF37DAC18559}"/>
               </a:ext>
             </a:extLst>
           </p:cNvPr>
@@ -4041,6 +4067,13 @@
   <p:clrMapOvr>
     <a:masterClrMapping/>
   </p:clrMapOvr>
+  <p:timing>
+    <p:tnLst>
+      <p:par>
+        <p:cTn id="1" dur="indefinite" restart="never" nodeType="tmRoot"/>
+      </p:par>
+    </p:tnLst>
+  </p:timing>
 </p:sld>
 </file>
 
@@ -4066,7 +4099,7 @@
           <p:cNvPr id="5" name="图片 4">
             <a:extLst>
               <a:ext uri="{FF2B5EF4-FFF2-40B4-BE49-F238E27FC236}">
-                <a16:creationId xmlns:a16="http://schemas.microsoft.com/office/drawing/2014/main" id="{48447631-A420-48B2-9D75-5B729701D525}"/>
+                <a16:creationId xmlns="" xmlns:a16="http://schemas.microsoft.com/office/drawing/2014/main" id="{48447631-A420-48B2-9D75-5B729701D525}"/>
               </a:ext>
             </a:extLst>
           </p:cNvPr>
@@ -4102,7 +4135,7 @@
           <p:cNvPr id="2" name="标题 1">
             <a:extLst>
               <a:ext uri="{FF2B5EF4-FFF2-40B4-BE49-F238E27FC236}">
-                <a16:creationId xmlns:a16="http://schemas.microsoft.com/office/drawing/2014/main" id="{34BD74B6-F73E-443F-A0C6-7A71D668DBA9}"/>
+                <a16:creationId xmlns="" xmlns:a16="http://schemas.microsoft.com/office/drawing/2014/main" id="{34BD74B6-F73E-443F-A0C6-7A71D668DBA9}"/>
               </a:ext>
             </a:extLst>
           </p:cNvPr>
@@ -4131,7 +4164,7 @@
           <p:cNvPr id="3" name="内容占位符 2">
             <a:extLst>
               <a:ext uri="{FF2B5EF4-FFF2-40B4-BE49-F238E27FC236}">
-                <a16:creationId xmlns:a16="http://schemas.microsoft.com/office/drawing/2014/main" id="{8C470F00-0A0C-4974-84C9-FA25AD7C31D5}"/>
+                <a16:creationId xmlns="" xmlns:a16="http://schemas.microsoft.com/office/drawing/2014/main" id="{8C470F00-0A0C-4974-84C9-FA25AD7C31D5}"/>
               </a:ext>
             </a:extLst>
           </p:cNvPr>
@@ -4203,6 +4236,13 @@
   <p:clrMapOvr>
     <a:masterClrMapping/>
   </p:clrMapOvr>
+  <p:timing>
+    <p:tnLst>
+      <p:par>
+        <p:cTn id="1" dur="indefinite" restart="never" nodeType="tmRoot"/>
+      </p:par>
+    </p:tnLst>
+  </p:timing>
 </p:sld>
 </file>
 
@@ -4228,7 +4268,7 @@
           <p:cNvPr id="5" name="图片 4">
             <a:extLst>
               <a:ext uri="{FF2B5EF4-FFF2-40B4-BE49-F238E27FC236}">
-                <a16:creationId xmlns:a16="http://schemas.microsoft.com/office/drawing/2014/main" id="{3980A5FB-4068-402A-A704-3E2FCCFC9E60}"/>
+                <a16:creationId xmlns="" xmlns:a16="http://schemas.microsoft.com/office/drawing/2014/main" id="{3980A5FB-4068-402A-A704-3E2FCCFC9E60}"/>
               </a:ext>
             </a:extLst>
           </p:cNvPr>
@@ -4264,7 +4304,7 @@
           <p:cNvPr id="2" name="标题 1">
             <a:extLst>
               <a:ext uri="{FF2B5EF4-FFF2-40B4-BE49-F238E27FC236}">
-                <a16:creationId xmlns:a16="http://schemas.microsoft.com/office/drawing/2014/main" id="{AF3AB6FD-9D6A-4D42-B29F-6C289AD0EF29}"/>
+                <a16:creationId xmlns="" xmlns:a16="http://schemas.microsoft.com/office/drawing/2014/main" id="{AF3AB6FD-9D6A-4D42-B29F-6C289AD0EF29}"/>
               </a:ext>
             </a:extLst>
           </p:cNvPr>
@@ -4293,7 +4333,7 @@
           <p:cNvPr id="3" name="内容占位符 2">
             <a:extLst>
               <a:ext uri="{FF2B5EF4-FFF2-40B4-BE49-F238E27FC236}">
-                <a16:creationId xmlns:a16="http://schemas.microsoft.com/office/drawing/2014/main" id="{9E499BD3-3DC2-4257-AFBB-A11C1044021A}"/>
+                <a16:creationId xmlns="" xmlns:a16="http://schemas.microsoft.com/office/drawing/2014/main" id="{9E499BD3-3DC2-4257-AFBB-A11C1044021A}"/>
               </a:ext>
             </a:extLst>
           </p:cNvPr>
@@ -4373,6 +4413,13 @@
   <p:clrMapOvr>
     <a:masterClrMapping/>
   </p:clrMapOvr>
+  <p:timing>
+    <p:tnLst>
+      <p:par>
+        <p:cTn id="1" dur="indefinite" restart="never" nodeType="tmRoot"/>
+      </p:par>
+    </p:tnLst>
+  </p:timing>
 </p:sld>
 </file>
 
@@ -4393,12 +4440,42 @@
           <a:chExt cx="0" cy="0"/>
         </a:xfrm>
       </p:grpSpPr>
+      <p:pic>
+        <p:nvPicPr>
+          <p:cNvPr id="7" name="图片 6"/>
+          <p:cNvPicPr>
+            <a:picLocks noChangeAspect="1"/>
+          </p:cNvPicPr>
+          <p:nvPr/>
+        </p:nvPicPr>
+        <p:blipFill>
+          <a:blip r:embed="rId2">
+            <a:extLst>
+              <a:ext uri="{28A0092B-C50C-407E-A947-70E740481C1C}">
+                <a14:useLocalDpi xmlns:a14="http://schemas.microsoft.com/office/drawing/2010/main" val="0"/>
+              </a:ext>
+            </a:extLst>
+          </a:blip>
+          <a:stretch>
+            <a:fillRect/>
+          </a:stretch>
+        </p:blipFill>
+        <p:spPr>
+          <a:xfrm>
+            <a:off x="5805235" y="2370124"/>
+            <a:ext cx="5416892" cy="4113022"/>
+          </a:xfrm>
+          <a:prstGeom prst="rect">
+            <a:avLst/>
+          </a:prstGeom>
+        </p:spPr>
+      </p:pic>
       <p:sp>
         <p:nvSpPr>
           <p:cNvPr id="2" name="标题 1">
             <a:extLst>
               <a:ext uri="{FF2B5EF4-FFF2-40B4-BE49-F238E27FC236}">
-                <a16:creationId xmlns:a16="http://schemas.microsoft.com/office/drawing/2014/main" id="{3A20744B-E0BA-4036-A039-D72B4F73CA96}"/>
+                <a16:creationId xmlns="" xmlns:a16="http://schemas.microsoft.com/office/drawing/2014/main" id="{3A20744B-E0BA-4036-A039-D72B4F73CA96}"/>
               </a:ext>
             </a:extLst>
           </p:cNvPr>
@@ -4427,7 +4504,7 @@
           <p:cNvPr id="3" name="内容占位符 2">
             <a:extLst>
               <a:ext uri="{FF2B5EF4-FFF2-40B4-BE49-F238E27FC236}">
-                <a16:creationId xmlns:a16="http://schemas.microsoft.com/office/drawing/2014/main" id="{14E511F2-CD50-41F7-B741-0034B99DA0F1}"/>
+                <a16:creationId xmlns="" xmlns:a16="http://schemas.microsoft.com/office/drawing/2014/main" id="{14E511F2-CD50-41F7-B741-0034B99DA0F1}"/>
               </a:ext>
             </a:extLst>
           </p:cNvPr>
@@ -4440,13 +4517,172 @@
         </p:nvSpPr>
         <p:spPr/>
         <p:txBody>
-          <a:bodyPr/>
-          <a:lstStyle/>
-          <a:p>
-            <a:endParaRPr lang="zh-CN" altLang="en-US"/>
-          </a:p>
-        </p:txBody>
-      </p:sp>
+          <a:bodyPr>
+            <a:normAutofit/>
+          </a:bodyPr>
+          <a:lstStyle/>
+          <a:p>
+            <a:r>
+              <a:rPr lang="en-US" altLang="zh-CN" dirty="0" smtClean="0"/>
+              <a:t>Performance</a:t>
+            </a:r>
+          </a:p>
+          <a:p>
+            <a:pPr lvl="1"/>
+            <a:r>
+              <a:rPr lang="en-US" altLang="zh-CN" dirty="0">
+                <a:latin typeface="Arial" panose="020B0604020202020204" pitchFamily="34" charset="0"/>
+                <a:cs typeface="Arial" panose="020B0604020202020204" pitchFamily="34" charset="0"/>
+              </a:rPr>
+              <a:t>130 </a:t>
+            </a:r>
+            <a:r>
+              <a:rPr lang="en-US" altLang="zh-CN" dirty="0" smtClean="0">
+                <a:latin typeface="Arial" panose="020B0604020202020204" pitchFamily="34" charset="0"/>
+                <a:cs typeface="Arial" panose="020B0604020202020204" pitchFamily="34" charset="0"/>
+              </a:rPr>
+              <a:t>hours</a:t>
+            </a:r>
+          </a:p>
+          <a:p>
+            <a:pPr lvl="1"/>
+            <a:r>
+              <a:rPr lang="en-US" altLang="zh-CN" dirty="0" smtClean="0">
+                <a:latin typeface="Arial" panose="020B0604020202020204" pitchFamily="34" charset="0"/>
+                <a:cs typeface="Arial" panose="020B0604020202020204" pitchFamily="34" charset="0"/>
+              </a:rPr>
+              <a:t>NVIDIA </a:t>
+            </a:r>
+            <a:r>
+              <a:rPr lang="en-US" altLang="zh-CN" dirty="0">
+                <a:latin typeface="Arial" panose="020B0604020202020204" pitchFamily="34" charset="0"/>
+                <a:cs typeface="Arial" panose="020B0604020202020204" pitchFamily="34" charset="0"/>
+              </a:rPr>
+              <a:t>GTX 1080 GPU</a:t>
+            </a:r>
+            <a:endParaRPr lang="en-US" altLang="zh-CN" dirty="0" smtClean="0"/>
+          </a:p>
+          <a:p>
+            <a:r>
+              <a:rPr lang="en-US" altLang="zh-CN" dirty="0" smtClean="0"/>
+              <a:t>Curriculum Learning</a:t>
+            </a:r>
+          </a:p>
+          <a:p>
+            <a:r>
+              <a:rPr lang="en-US" altLang="zh-CN" dirty="0" smtClean="0"/>
+              <a:t>Loss Function</a:t>
+            </a:r>
+          </a:p>
+          <a:p>
+            <a:pPr lvl="1"/>
+            <a:r>
+              <a:rPr lang="en-US" altLang="zh-CN" dirty="0" smtClean="0"/>
+              <a:t>key loss</a:t>
+            </a:r>
+          </a:p>
+          <a:p>
+            <a:pPr lvl="1"/>
+            <a:r>
+              <a:rPr lang="en-US" altLang="zh-CN" dirty="0" smtClean="0"/>
+              <a:t>frame prediction loss</a:t>
+            </a:r>
+          </a:p>
+          <a:p>
+            <a:endParaRPr lang="zh-CN" altLang="en-US" dirty="0"/>
+          </a:p>
+        </p:txBody>
+      </p:sp>
+      <p:pic>
+        <p:nvPicPr>
+          <p:cNvPr id="4" name="图片 3"/>
+          <p:cNvPicPr>
+            <a:picLocks noChangeAspect="1"/>
+          </p:cNvPicPr>
+          <p:nvPr/>
+        </p:nvPicPr>
+        <p:blipFill>
+          <a:blip r:embed="rId3">
+            <a:extLst>
+              <a:ext uri="{28A0092B-C50C-407E-A947-70E740481C1C}">
+                <a14:useLocalDpi xmlns:a14="http://schemas.microsoft.com/office/drawing/2010/main" val="0"/>
+              </a:ext>
+            </a:extLst>
+          </a:blip>
+          <a:stretch>
+            <a:fillRect/>
+          </a:stretch>
+        </p:blipFill>
+        <p:spPr>
+          <a:xfrm>
+            <a:off x="838200" y="4587529"/>
+            <a:ext cx="4393785" cy="774662"/>
+          </a:xfrm>
+          <a:prstGeom prst="rect">
+            <a:avLst/>
+          </a:prstGeom>
+        </p:spPr>
+      </p:pic>
+      <p:pic>
+        <p:nvPicPr>
+          <p:cNvPr id="5" name="图片 4"/>
+          <p:cNvPicPr>
+            <a:picLocks noChangeAspect="1"/>
+          </p:cNvPicPr>
+          <p:nvPr/>
+        </p:nvPicPr>
+        <p:blipFill>
+          <a:blip r:embed="rId4">
+            <a:extLst>
+              <a:ext uri="{28A0092B-C50C-407E-A947-70E740481C1C}">
+                <a14:useLocalDpi xmlns:a14="http://schemas.microsoft.com/office/drawing/2010/main" val="0"/>
+              </a:ext>
+            </a:extLst>
+          </a:blip>
+          <a:stretch>
+            <a:fillRect/>
+          </a:stretch>
+        </p:blipFill>
+        <p:spPr>
+          <a:xfrm>
+            <a:off x="957173" y="5586577"/>
+            <a:ext cx="2400000" cy="638095"/>
+          </a:xfrm>
+          <a:prstGeom prst="rect">
+            <a:avLst/>
+          </a:prstGeom>
+        </p:spPr>
+      </p:pic>
+      <p:pic>
+        <p:nvPicPr>
+          <p:cNvPr id="8" name="图片 7"/>
+          <p:cNvPicPr>
+            <a:picLocks noChangeAspect="1"/>
+          </p:cNvPicPr>
+          <p:nvPr/>
+        </p:nvPicPr>
+        <p:blipFill>
+          <a:blip r:embed="rId5">
+            <a:extLst>
+              <a:ext uri="{28A0092B-C50C-407E-A947-70E740481C1C}">
+                <a14:useLocalDpi xmlns:a14="http://schemas.microsoft.com/office/drawing/2010/main" val="0"/>
+              </a:ext>
+            </a:extLst>
+          </a:blip>
+          <a:stretch>
+            <a:fillRect/>
+          </a:stretch>
+        </p:blipFill>
+        <p:spPr>
+          <a:xfrm>
+            <a:off x="5982417" y="388946"/>
+            <a:ext cx="5565892" cy="1957357"/>
+          </a:xfrm>
+          <a:prstGeom prst="rect">
+            <a:avLst/>
+          </a:prstGeom>
+        </p:spPr>
+      </p:pic>
     </p:spTree>
     <p:extLst>
       <p:ext uri="{BB962C8B-B14F-4D97-AF65-F5344CB8AC3E}">
@@ -4457,6 +4693,13 @@
   <p:clrMapOvr>
     <a:masterClrMapping/>
   </p:clrMapOvr>
+  <p:timing>
+    <p:tnLst>
+      <p:par>
+        <p:cTn id="1" dur="indefinite" restart="never" nodeType="tmRoot"/>
+      </p:par>
+    </p:tnLst>
+  </p:timing>
 </p:sld>
 </file>
 
@@ -4482,7 +4725,7 @@
           <p:cNvPr id="7" name="图片 6">
             <a:extLst>
               <a:ext uri="{FF2B5EF4-FFF2-40B4-BE49-F238E27FC236}">
-                <a16:creationId xmlns:a16="http://schemas.microsoft.com/office/drawing/2014/main" id="{54F05EB2-189D-4D19-B09B-17263F8F116E}"/>
+                <a16:creationId xmlns="" xmlns:a16="http://schemas.microsoft.com/office/drawing/2014/main" id="{54F05EB2-189D-4D19-B09B-17263F8F116E}"/>
               </a:ext>
             </a:extLst>
           </p:cNvPr>
@@ -4518,7 +4761,7 @@
           <p:cNvPr id="2" name="标题 1">
             <a:extLst>
               <a:ext uri="{FF2B5EF4-FFF2-40B4-BE49-F238E27FC236}">
-                <a16:creationId xmlns:a16="http://schemas.microsoft.com/office/drawing/2014/main" id="{76C3D1C0-FE88-4946-A915-658C21BFECBD}"/>
+                <a16:creationId xmlns="" xmlns:a16="http://schemas.microsoft.com/office/drawing/2014/main" id="{76C3D1C0-FE88-4946-A915-658C21BFECBD}"/>
               </a:ext>
             </a:extLst>
           </p:cNvPr>
@@ -4547,7 +4790,7 @@
           <p:cNvPr id="11" name="图片 10">
             <a:extLst>
               <a:ext uri="{FF2B5EF4-FFF2-40B4-BE49-F238E27FC236}">
-                <a16:creationId xmlns:a16="http://schemas.microsoft.com/office/drawing/2014/main" id="{8B56A669-126F-4F94-8C57-BF529EDFB351}"/>
+                <a16:creationId xmlns="" xmlns:a16="http://schemas.microsoft.com/office/drawing/2014/main" id="{8B56A669-126F-4F94-8C57-BF529EDFB351}"/>
               </a:ext>
             </a:extLst>
           </p:cNvPr>
@@ -4583,7 +4826,7 @@
           <p:cNvPr id="13" name="图片 12">
             <a:extLst>
               <a:ext uri="{FF2B5EF4-FFF2-40B4-BE49-F238E27FC236}">
-                <a16:creationId xmlns:a16="http://schemas.microsoft.com/office/drawing/2014/main" id="{7308583F-6801-4023-A7B7-EF864285EA66}"/>
+                <a16:creationId xmlns="" xmlns:a16="http://schemas.microsoft.com/office/drawing/2014/main" id="{7308583F-6801-4023-A7B7-EF864285EA66}"/>
               </a:ext>
             </a:extLst>
           </p:cNvPr>
@@ -4624,6 +4867,13 @@
   <p:clrMapOvr>
     <a:masterClrMapping/>
   </p:clrMapOvr>
+  <p:timing>
+    <p:tnLst>
+      <p:par>
+        <p:cTn id="1" dur="indefinite" restart="never" nodeType="tmRoot"/>
+      </p:par>
+    </p:tnLst>
+  </p:timing>
 </p:sld>
 </file>
 
@@ -4649,7 +4899,7 @@
           <p:cNvPr id="2" name="标题 1">
             <a:extLst>
               <a:ext uri="{FF2B5EF4-FFF2-40B4-BE49-F238E27FC236}">
-                <a16:creationId xmlns:a16="http://schemas.microsoft.com/office/drawing/2014/main" id="{1404EB90-0416-4981-94A5-689E82D8F569}"/>
+                <a16:creationId xmlns="" xmlns:a16="http://schemas.microsoft.com/office/drawing/2014/main" id="{1404EB90-0416-4981-94A5-689E82D8F569}"/>
               </a:ext>
             </a:extLst>
           </p:cNvPr>
@@ -4678,7 +4928,7 @@
           <p:cNvPr id="4" name="图片 3">
             <a:extLst>
               <a:ext uri="{FF2B5EF4-FFF2-40B4-BE49-F238E27FC236}">
-                <a16:creationId xmlns:a16="http://schemas.microsoft.com/office/drawing/2014/main" id="{BF935A7D-3539-4332-8C2C-A51DE737ECA4}"/>
+                <a16:creationId xmlns="" xmlns:a16="http://schemas.microsoft.com/office/drawing/2014/main" id="{BF935A7D-3539-4332-8C2C-A51DE737ECA4}"/>
               </a:ext>
             </a:extLst>
           </p:cNvPr>
@@ -4701,8 +4951,8 @@
         </p:blipFill>
         <p:spPr>
           <a:xfrm>
-            <a:off x="6493934" y="430861"/>
-            <a:ext cx="4758266" cy="5996277"/>
+            <a:off x="6464300" y="365125"/>
+            <a:ext cx="4889500" cy="6161656"/>
           </a:xfrm>
           <a:prstGeom prst="rect">
             <a:avLst/>
@@ -4714,7 +4964,7 @@
           <p:cNvPr id="6" name="图片 5">
             <a:extLst>
               <a:ext uri="{FF2B5EF4-FFF2-40B4-BE49-F238E27FC236}">
-                <a16:creationId xmlns:a16="http://schemas.microsoft.com/office/drawing/2014/main" id="{8B3F091F-B422-406E-B333-836014589461}"/>
+                <a16:creationId xmlns="" xmlns:a16="http://schemas.microsoft.com/office/drawing/2014/main" id="{8B3F091F-B422-406E-B333-836014589461}"/>
               </a:ext>
             </a:extLst>
           </p:cNvPr>
@@ -4755,6 +5005,13 @@
   <p:clrMapOvr>
     <a:masterClrMapping/>
   </p:clrMapOvr>
+  <p:timing>
+    <p:tnLst>
+      <p:par>
+        <p:cTn id="1" dur="indefinite" restart="never" nodeType="tmRoot"/>
+      </p:par>
+    </p:tnLst>
+  </p:timing>
 </p:sld>
 </file>
 
@@ -4780,7 +5037,7 @@
           <p:cNvPr id="2" name="标题 1">
             <a:extLst>
               <a:ext uri="{FF2B5EF4-FFF2-40B4-BE49-F238E27FC236}">
-                <a16:creationId xmlns:a16="http://schemas.microsoft.com/office/drawing/2014/main" id="{1404EB90-0416-4981-94A5-689E82D8F569}"/>
+                <a16:creationId xmlns="" xmlns:a16="http://schemas.microsoft.com/office/drawing/2014/main" id="{1404EB90-0416-4981-94A5-689E82D8F569}"/>
               </a:ext>
             </a:extLst>
           </p:cNvPr>
@@ -4809,7 +5066,7 @@
           <p:cNvPr id="4" name="图片 3">
             <a:extLst>
               <a:ext uri="{FF2B5EF4-FFF2-40B4-BE49-F238E27FC236}">
-                <a16:creationId xmlns:a16="http://schemas.microsoft.com/office/drawing/2014/main" id="{D18EA243-3095-4774-9902-EDFA067BE898}"/>
+                <a16:creationId xmlns="" xmlns:a16="http://schemas.microsoft.com/office/drawing/2014/main" id="{D18EA243-3095-4774-9902-EDFA067BE898}"/>
               </a:ext>
             </a:extLst>
           </p:cNvPr>
@@ -4845,7 +5102,7 @@
           <p:cNvPr id="6" name="图片 5">
             <a:extLst>
               <a:ext uri="{FF2B5EF4-FFF2-40B4-BE49-F238E27FC236}">
-                <a16:creationId xmlns:a16="http://schemas.microsoft.com/office/drawing/2014/main" id="{3DBDD1CD-96A9-4AE9-A5FD-46B86152FDA2}"/>
+                <a16:creationId xmlns="" xmlns:a16="http://schemas.microsoft.com/office/drawing/2014/main" id="{3DBDD1CD-96A9-4AE9-A5FD-46B86152FDA2}"/>
               </a:ext>
             </a:extLst>
           </p:cNvPr>
@@ -4886,6 +5143,133 @@
   <p:clrMapOvr>
     <a:masterClrMapping/>
   </p:clrMapOvr>
+  <p:timing>
+    <p:tnLst>
+      <p:par>
+        <p:cTn id="1" dur="indefinite" restart="never" nodeType="tmRoot"/>
+      </p:par>
+    </p:tnLst>
+  </p:timing>
+</p:sld>
+</file>
+
+<file path=ppt/slides/slide19.xml><?xml version="1.0" encoding="utf-8"?>
+<p:sld xmlns:a="http://schemas.openxmlformats.org/drawingml/2006/main" xmlns:r="http://schemas.openxmlformats.org/officeDocument/2006/relationships" xmlns:p="http://schemas.openxmlformats.org/presentationml/2006/main">
+  <p:cSld>
+    <p:spTree>
+      <p:nvGrpSpPr>
+        <p:cNvPr id="1" name=""/>
+        <p:cNvGrpSpPr/>
+        <p:nvPr/>
+      </p:nvGrpSpPr>
+      <p:grpSpPr>
+        <a:xfrm>
+          <a:off x="0" y="0"/>
+          <a:ext cx="0" cy="0"/>
+          <a:chOff x="0" y="0"/>
+          <a:chExt cx="0" cy="0"/>
+        </a:xfrm>
+      </p:grpSpPr>
+      <p:sp>
+        <p:nvSpPr>
+          <p:cNvPr id="2" name="标题 1"/>
+          <p:cNvSpPr>
+            <a:spLocks noGrp="1"/>
+          </p:cNvSpPr>
+          <p:nvPr>
+            <p:ph type="title"/>
+          </p:nvPr>
+        </p:nvSpPr>
+        <p:spPr/>
+        <p:txBody>
+          <a:bodyPr/>
+          <a:lstStyle/>
+          <a:p>
+            <a:r>
+              <a:rPr lang="en-US" altLang="zh-CN" dirty="0" smtClean="0"/>
+              <a:t>8. Results</a:t>
+            </a:r>
+            <a:endParaRPr lang="zh-CN" altLang="en-US" dirty="0"/>
+          </a:p>
+        </p:txBody>
+      </p:sp>
+      <p:pic>
+        <p:nvPicPr>
+          <p:cNvPr id="4" name="图片 3"/>
+          <p:cNvPicPr>
+            <a:picLocks noChangeAspect="1"/>
+          </p:cNvPicPr>
+          <p:nvPr/>
+        </p:nvPicPr>
+        <p:blipFill>
+          <a:blip r:embed="rId2">
+            <a:extLst>
+              <a:ext uri="{28A0092B-C50C-407E-A947-70E740481C1C}">
+                <a14:useLocalDpi xmlns:a14="http://schemas.microsoft.com/office/drawing/2010/main" val="0"/>
+              </a:ext>
+            </a:extLst>
+          </a:blip>
+          <a:stretch>
+            <a:fillRect/>
+          </a:stretch>
+        </p:blipFill>
+        <p:spPr>
+          <a:xfrm>
+            <a:off x="5143501" y="265698"/>
+            <a:ext cx="6616700" cy="6440042"/>
+          </a:xfrm>
+          <a:prstGeom prst="rect">
+            <a:avLst/>
+          </a:prstGeom>
+        </p:spPr>
+      </p:pic>
+      <p:pic>
+        <p:nvPicPr>
+          <p:cNvPr id="5" name="图片 4"/>
+          <p:cNvPicPr>
+            <a:picLocks noChangeAspect="1"/>
+          </p:cNvPicPr>
+          <p:nvPr/>
+        </p:nvPicPr>
+        <p:blipFill>
+          <a:blip r:embed="rId3">
+            <a:extLst>
+              <a:ext uri="{28A0092B-C50C-407E-A947-70E740481C1C}">
+                <a14:useLocalDpi xmlns:a14="http://schemas.microsoft.com/office/drawing/2010/main" val="0"/>
+              </a:ext>
+            </a:extLst>
+          </a:blip>
+          <a:stretch>
+            <a:fillRect/>
+          </a:stretch>
+        </p:blipFill>
+        <p:spPr>
+          <a:xfrm>
+            <a:off x="180461" y="3048000"/>
+            <a:ext cx="6080242" cy="1003300"/>
+          </a:xfrm>
+          <a:prstGeom prst="rect">
+            <a:avLst/>
+          </a:prstGeom>
+        </p:spPr>
+      </p:pic>
+    </p:spTree>
+    <p:extLst>
+      <p:ext uri="{BB962C8B-B14F-4D97-AF65-F5344CB8AC3E}">
+        <p14:creationId xmlns:p14="http://schemas.microsoft.com/office/powerpoint/2010/main" val="524767690"/>
+      </p:ext>
+    </p:extLst>
+  </p:cSld>
+  <p:clrMapOvr>
+    <a:masterClrMapping/>
+  </p:clrMapOvr>
+  <p:timing>
+    <p:tnLst>
+      <p:par>
+        <p:cTn id="1" dur="indefinite" restart="never" nodeType="tmRoot"/>
+      </p:par>
+    </p:tnLst>
+  </p:timing>
 </p:sld>
 </file>
 
@@ -4911,7 +5295,7 @@
           <p:cNvPr id="2" name="标题 1">
             <a:extLst>
               <a:ext uri="{FF2B5EF4-FFF2-40B4-BE49-F238E27FC236}">
-                <a16:creationId xmlns:a16="http://schemas.microsoft.com/office/drawing/2014/main" id="{D115A7A7-F290-4BA0-8634-1C4E8F2D9908}"/>
+                <a16:creationId xmlns="" xmlns:a16="http://schemas.microsoft.com/office/drawing/2014/main" id="{D115A7A7-F290-4BA0-8634-1C4E8F2D9908}"/>
               </a:ext>
             </a:extLst>
           </p:cNvPr>
@@ -4940,7 +5324,7 @@
           <p:cNvPr id="3" name="内容占位符 2">
             <a:extLst>
               <a:ext uri="{FF2B5EF4-FFF2-40B4-BE49-F238E27FC236}">
-                <a16:creationId xmlns:a16="http://schemas.microsoft.com/office/drawing/2014/main" id="{ED398C1E-BBB6-4188-BC24-78B716A2EE6D}"/>
+                <a16:creationId xmlns="" xmlns:a16="http://schemas.microsoft.com/office/drawing/2014/main" id="{ED398C1E-BBB6-4188-BC24-78B716A2EE6D}"/>
               </a:ext>
             </a:extLst>
           </p:cNvPr>
@@ -5060,6 +5444,421 @@
   <p:clrMapOvr>
     <a:masterClrMapping/>
   </p:clrMapOvr>
+  <p:timing>
+    <p:tnLst>
+      <p:par>
+        <p:cTn id="1" dur="indefinite" restart="never" nodeType="tmRoot"/>
+      </p:par>
+    </p:tnLst>
+  </p:timing>
+</p:sld>
+</file>
+
+<file path=ppt/slides/slide20.xml><?xml version="1.0" encoding="utf-8"?>
+<p:sld xmlns:a="http://schemas.openxmlformats.org/drawingml/2006/main" xmlns:r="http://schemas.openxmlformats.org/officeDocument/2006/relationships" xmlns:p="http://schemas.openxmlformats.org/presentationml/2006/main">
+  <p:cSld>
+    <p:spTree>
+      <p:nvGrpSpPr>
+        <p:cNvPr id="1" name=""/>
+        <p:cNvGrpSpPr/>
+        <p:nvPr/>
+      </p:nvGrpSpPr>
+      <p:grpSpPr>
+        <a:xfrm>
+          <a:off x="0" y="0"/>
+          <a:ext cx="0" cy="0"/>
+          <a:chOff x="0" y="0"/>
+          <a:chExt cx="0" cy="0"/>
+        </a:xfrm>
+      </p:grpSpPr>
+      <p:sp>
+        <p:nvSpPr>
+          <p:cNvPr id="2" name="标题 1"/>
+          <p:cNvSpPr>
+            <a:spLocks noGrp="1"/>
+          </p:cNvSpPr>
+          <p:nvPr>
+            <p:ph type="title"/>
+          </p:nvPr>
+        </p:nvSpPr>
+        <p:spPr/>
+        <p:txBody>
+          <a:bodyPr/>
+          <a:lstStyle/>
+          <a:p>
+            <a:r>
+              <a:rPr lang="en-US" altLang="zh-CN" dirty="0" smtClean="0"/>
+              <a:t>8. Results</a:t>
+            </a:r>
+            <a:endParaRPr lang="zh-CN" altLang="en-US" dirty="0"/>
+          </a:p>
+        </p:txBody>
+      </p:sp>
+      <p:pic>
+        <p:nvPicPr>
+          <p:cNvPr id="4" name="图片 3"/>
+          <p:cNvPicPr>
+            <a:picLocks noChangeAspect="1"/>
+          </p:cNvPicPr>
+          <p:nvPr/>
+        </p:nvPicPr>
+        <p:blipFill>
+          <a:blip r:embed="rId2">
+            <a:extLst>
+              <a:ext uri="{28A0092B-C50C-407E-A947-70E740481C1C}">
+                <a14:useLocalDpi xmlns:a14="http://schemas.microsoft.com/office/drawing/2010/main" val="0"/>
+              </a:ext>
+            </a:extLst>
+          </a:blip>
+          <a:stretch>
+            <a:fillRect/>
+          </a:stretch>
+        </p:blipFill>
+        <p:spPr>
+          <a:xfrm>
+            <a:off x="6940328" y="365125"/>
+            <a:ext cx="3401819" cy="6374486"/>
+          </a:xfrm>
+          <a:prstGeom prst="rect">
+            <a:avLst/>
+          </a:prstGeom>
+        </p:spPr>
+      </p:pic>
+      <p:pic>
+        <p:nvPicPr>
+          <p:cNvPr id="5" name="图片 4"/>
+          <p:cNvPicPr>
+            <a:picLocks noChangeAspect="1"/>
+          </p:cNvPicPr>
+          <p:nvPr/>
+        </p:nvPicPr>
+        <p:blipFill>
+          <a:blip r:embed="rId3">
+            <a:extLst>
+              <a:ext uri="{28A0092B-C50C-407E-A947-70E740481C1C}">
+                <a14:useLocalDpi xmlns:a14="http://schemas.microsoft.com/office/drawing/2010/main" val="0"/>
+              </a:ext>
+            </a:extLst>
+          </a:blip>
+          <a:stretch>
+            <a:fillRect/>
+          </a:stretch>
+        </p:blipFill>
+        <p:spPr>
+          <a:xfrm>
+            <a:off x="396362" y="2819401"/>
+            <a:ext cx="6119306" cy="1204396"/>
+          </a:xfrm>
+          <a:prstGeom prst="rect">
+            <a:avLst/>
+          </a:prstGeom>
+        </p:spPr>
+      </p:pic>
+    </p:spTree>
+    <p:extLst>
+      <p:ext uri="{BB962C8B-B14F-4D97-AF65-F5344CB8AC3E}">
+        <p14:creationId xmlns:p14="http://schemas.microsoft.com/office/powerpoint/2010/main" val="979532135"/>
+      </p:ext>
+    </p:extLst>
+  </p:cSld>
+  <p:clrMapOvr>
+    <a:masterClrMapping/>
+  </p:clrMapOvr>
+  <p:timing>
+    <p:tnLst>
+      <p:par>
+        <p:cTn id="1" dur="indefinite" restart="never" nodeType="tmRoot"/>
+      </p:par>
+    </p:tnLst>
+  </p:timing>
+</p:sld>
+</file>
+
+<file path=ppt/slides/slide21.xml><?xml version="1.0" encoding="utf-8"?>
+<p:sld xmlns:a="http://schemas.openxmlformats.org/drawingml/2006/main" xmlns:r="http://schemas.openxmlformats.org/officeDocument/2006/relationships" xmlns:p="http://schemas.openxmlformats.org/presentationml/2006/main">
+  <p:cSld>
+    <p:spTree>
+      <p:nvGrpSpPr>
+        <p:cNvPr id="1" name=""/>
+        <p:cNvGrpSpPr/>
+        <p:nvPr/>
+      </p:nvGrpSpPr>
+      <p:grpSpPr>
+        <a:xfrm>
+          <a:off x="0" y="0"/>
+          <a:ext cx="0" cy="0"/>
+          <a:chOff x="0" y="0"/>
+          <a:chExt cx="0" cy="0"/>
+        </a:xfrm>
+      </p:grpSpPr>
+      <p:sp>
+        <p:nvSpPr>
+          <p:cNvPr id="2" name="标题 1"/>
+          <p:cNvSpPr>
+            <a:spLocks noGrp="1"/>
+          </p:cNvSpPr>
+          <p:nvPr>
+            <p:ph type="title"/>
+          </p:nvPr>
+        </p:nvSpPr>
+        <p:spPr/>
+        <p:txBody>
+          <a:bodyPr/>
+          <a:lstStyle/>
+          <a:p>
+            <a:r>
+              <a:rPr lang="en-US" altLang="zh-CN" dirty="0" smtClean="0"/>
+              <a:t>8. Results</a:t>
+            </a:r>
+            <a:endParaRPr lang="zh-CN" altLang="en-US" dirty="0"/>
+          </a:p>
+        </p:txBody>
+      </p:sp>
+      <p:pic>
+        <p:nvPicPr>
+          <p:cNvPr id="4" name="图片 3"/>
+          <p:cNvPicPr>
+            <a:picLocks noChangeAspect="1"/>
+          </p:cNvPicPr>
+          <p:nvPr/>
+        </p:nvPicPr>
+        <p:blipFill>
+          <a:blip r:embed="rId2">
+            <a:extLst>
+              <a:ext uri="{28A0092B-C50C-407E-A947-70E740481C1C}">
+                <a14:useLocalDpi xmlns:a14="http://schemas.microsoft.com/office/drawing/2010/main" val="0"/>
+              </a:ext>
+            </a:extLst>
+          </a:blip>
+          <a:stretch>
+            <a:fillRect/>
+          </a:stretch>
+        </p:blipFill>
+        <p:spPr>
+          <a:xfrm>
+            <a:off x="5993290" y="512230"/>
+            <a:ext cx="5678010" cy="6028504"/>
+          </a:xfrm>
+          <a:prstGeom prst="rect">
+            <a:avLst/>
+          </a:prstGeom>
+        </p:spPr>
+      </p:pic>
+      <p:pic>
+        <p:nvPicPr>
+          <p:cNvPr id="5" name="图片 4"/>
+          <p:cNvPicPr>
+            <a:picLocks noChangeAspect="1"/>
+          </p:cNvPicPr>
+          <p:nvPr/>
+        </p:nvPicPr>
+        <p:blipFill>
+          <a:blip r:embed="rId3">
+            <a:extLst>
+              <a:ext uri="{28A0092B-C50C-407E-A947-70E740481C1C}">
+                <a14:useLocalDpi xmlns:a14="http://schemas.microsoft.com/office/drawing/2010/main" val="0"/>
+              </a:ext>
+            </a:extLst>
+          </a:blip>
+          <a:stretch>
+            <a:fillRect/>
+          </a:stretch>
+        </p:blipFill>
+        <p:spPr>
+          <a:xfrm>
+            <a:off x="250309" y="2835956"/>
+            <a:ext cx="5648728" cy="1381052"/>
+          </a:xfrm>
+          <a:prstGeom prst="rect">
+            <a:avLst/>
+          </a:prstGeom>
+        </p:spPr>
+      </p:pic>
+    </p:spTree>
+    <p:extLst>
+      <p:ext uri="{BB962C8B-B14F-4D97-AF65-F5344CB8AC3E}">
+        <p14:creationId xmlns:p14="http://schemas.microsoft.com/office/powerpoint/2010/main" val="580425729"/>
+      </p:ext>
+    </p:extLst>
+  </p:cSld>
+  <p:clrMapOvr>
+    <a:masterClrMapping/>
+  </p:clrMapOvr>
+  <p:timing>
+    <p:tnLst>
+      <p:par>
+        <p:cTn id="1" dur="indefinite" restart="never" nodeType="tmRoot"/>
+      </p:par>
+    </p:tnLst>
+  </p:timing>
+</p:sld>
+</file>
+
+<file path=ppt/slides/slide22.xml><?xml version="1.0" encoding="utf-8"?>
+<p:sld xmlns:a="http://schemas.openxmlformats.org/drawingml/2006/main" xmlns:r="http://schemas.openxmlformats.org/officeDocument/2006/relationships" xmlns:p="http://schemas.openxmlformats.org/presentationml/2006/main">
+  <p:cSld>
+    <p:spTree>
+      <p:nvGrpSpPr>
+        <p:cNvPr id="1" name=""/>
+        <p:cNvGrpSpPr/>
+        <p:nvPr/>
+      </p:nvGrpSpPr>
+      <p:grpSpPr>
+        <a:xfrm>
+          <a:off x="0" y="0"/>
+          <a:ext cx="0" cy="0"/>
+          <a:chOff x="0" y="0"/>
+          <a:chExt cx="0" cy="0"/>
+        </a:xfrm>
+      </p:grpSpPr>
+      <p:sp>
+        <p:nvSpPr>
+          <p:cNvPr id="2" name="标题 1"/>
+          <p:cNvSpPr>
+            <a:spLocks noGrp="1"/>
+          </p:cNvSpPr>
+          <p:nvPr>
+            <p:ph type="title"/>
+          </p:nvPr>
+        </p:nvSpPr>
+        <p:spPr/>
+        <p:txBody>
+          <a:bodyPr>
+            <a:normAutofit/>
+          </a:bodyPr>
+          <a:lstStyle/>
+          <a:p>
+            <a:r>
+              <a:rPr lang="en-US" altLang="zh-CN" dirty="0" smtClean="0"/>
+              <a:t>9. Comparison to Other Architectures</a:t>
+            </a:r>
+            <a:endParaRPr lang="zh-CN" altLang="en-US" dirty="0"/>
+          </a:p>
+        </p:txBody>
+      </p:sp>
+      <p:pic>
+        <p:nvPicPr>
+          <p:cNvPr id="4" name="图片 3"/>
+          <p:cNvPicPr>
+            <a:picLocks noChangeAspect="1"/>
+          </p:cNvPicPr>
+          <p:nvPr/>
+        </p:nvPicPr>
+        <p:blipFill>
+          <a:blip r:embed="rId2">
+            <a:extLst>
+              <a:ext uri="{28A0092B-C50C-407E-A947-70E740481C1C}">
+                <a14:useLocalDpi xmlns:a14="http://schemas.microsoft.com/office/drawing/2010/main" val="0"/>
+              </a:ext>
+            </a:extLst>
+          </a:blip>
+          <a:stretch>
+            <a:fillRect/>
+          </a:stretch>
+        </p:blipFill>
+        <p:spPr>
+          <a:xfrm>
+            <a:off x="2173883" y="1981200"/>
+            <a:ext cx="7844233" cy="2746271"/>
+          </a:xfrm>
+          <a:prstGeom prst="rect">
+            <a:avLst/>
+          </a:prstGeom>
+        </p:spPr>
+      </p:pic>
+    </p:spTree>
+    <p:extLst>
+      <p:ext uri="{BB962C8B-B14F-4D97-AF65-F5344CB8AC3E}">
+        <p14:creationId xmlns:p14="http://schemas.microsoft.com/office/powerpoint/2010/main" val="3008883363"/>
+      </p:ext>
+    </p:extLst>
+  </p:cSld>
+  <p:clrMapOvr>
+    <a:masterClrMapping/>
+  </p:clrMapOvr>
+  <p:timing>
+    <p:tnLst>
+      <p:par>
+        <p:cTn id="1" dur="indefinite" restart="never" nodeType="tmRoot"/>
+      </p:par>
+    </p:tnLst>
+  </p:timing>
+</p:sld>
+</file>
+
+<file path=ppt/slides/slide23.xml><?xml version="1.0" encoding="utf-8"?>
+<p:sld xmlns:a="http://schemas.openxmlformats.org/drawingml/2006/main" xmlns:r="http://schemas.openxmlformats.org/officeDocument/2006/relationships" xmlns:p="http://schemas.openxmlformats.org/presentationml/2006/main">
+  <p:cSld>
+    <p:spTree>
+      <p:nvGrpSpPr>
+        <p:cNvPr id="1" name=""/>
+        <p:cNvGrpSpPr/>
+        <p:nvPr/>
+      </p:nvGrpSpPr>
+      <p:grpSpPr>
+        <a:xfrm>
+          <a:off x="0" y="0"/>
+          <a:ext cx="0" cy="0"/>
+          <a:chOff x="0" y="0"/>
+          <a:chExt cx="0" cy="0"/>
+        </a:xfrm>
+      </p:grpSpPr>
+      <p:sp>
+        <p:nvSpPr>
+          <p:cNvPr id="4" name="文本框 3"/>
+          <p:cNvSpPr txBox="1"/>
+          <p:nvPr/>
+        </p:nvSpPr>
+        <p:spPr>
+          <a:xfrm>
+            <a:off x="5117323" y="2514600"/>
+            <a:ext cx="2262158" cy="923330"/>
+          </a:xfrm>
+          <a:prstGeom prst="rect">
+            <a:avLst/>
+          </a:prstGeom>
+          <a:noFill/>
+        </p:spPr>
+        <p:txBody>
+          <a:bodyPr wrap="none" rtlCol="0">
+            <a:spAutoFit/>
+          </a:bodyPr>
+          <a:lstStyle/>
+          <a:p>
+            <a:pPr algn="ctr"/>
+            <a:r>
+              <a:rPr lang="zh-CN" altLang="en-US" sz="5400" b="1" dirty="0" smtClean="0">
+                <a:latin typeface="微软雅黑" panose="020B0503020204020204" pitchFamily="34" charset="-122"/>
+                <a:ea typeface="微软雅黑" panose="020B0503020204020204" pitchFamily="34" charset="-122"/>
+                <a:cs typeface="Arial" panose="020B0604020202020204" pitchFamily="34" charset="0"/>
+              </a:rPr>
+              <a:t>谢谢！</a:t>
+            </a:r>
+            <a:endParaRPr lang="zh-CN" altLang="en-US" sz="5400" b="1" dirty="0">
+              <a:latin typeface="微软雅黑" panose="020B0503020204020204" pitchFamily="34" charset="-122"/>
+              <a:ea typeface="微软雅黑" panose="020B0503020204020204" pitchFamily="34" charset="-122"/>
+              <a:cs typeface="Arial" panose="020B0604020202020204" pitchFamily="34" charset="0"/>
+            </a:endParaRPr>
+          </a:p>
+        </p:txBody>
+      </p:sp>
+    </p:spTree>
+    <p:extLst>
+      <p:ext uri="{BB962C8B-B14F-4D97-AF65-F5344CB8AC3E}">
+        <p14:creationId xmlns:p14="http://schemas.microsoft.com/office/powerpoint/2010/main" val="2088727915"/>
+      </p:ext>
+    </p:extLst>
+  </p:cSld>
+  <p:clrMapOvr>
+    <a:masterClrMapping/>
+  </p:clrMapOvr>
+  <p:timing>
+    <p:tnLst>
+      <p:par>
+        <p:cTn id="1" dur="indefinite" restart="never" nodeType="tmRoot"/>
+      </p:par>
+    </p:tnLst>
+  </p:timing>
 </p:sld>
 </file>
 
@@ -5085,7 +5884,7 @@
           <p:cNvPr id="2" name="标题 1">
             <a:extLst>
               <a:ext uri="{FF2B5EF4-FFF2-40B4-BE49-F238E27FC236}">
-                <a16:creationId xmlns:a16="http://schemas.microsoft.com/office/drawing/2014/main" id="{AC7679E6-2156-4447-BB1B-875A49031AE1}"/>
+                <a16:creationId xmlns="" xmlns:a16="http://schemas.microsoft.com/office/drawing/2014/main" id="{AC7679E6-2156-4447-BB1B-875A49031AE1}"/>
               </a:ext>
             </a:extLst>
           </p:cNvPr>
@@ -5114,7 +5913,7 @@
           <p:cNvPr id="3" name="内容占位符 2">
             <a:extLst>
               <a:ext uri="{FF2B5EF4-FFF2-40B4-BE49-F238E27FC236}">
-                <a16:creationId xmlns:a16="http://schemas.microsoft.com/office/drawing/2014/main" id="{5E67B976-C393-49AF-9087-A7F0F919406F}"/>
+                <a16:creationId xmlns="" xmlns:a16="http://schemas.microsoft.com/office/drawing/2014/main" id="{5E67B976-C393-49AF-9087-A7F0F919406F}"/>
               </a:ext>
             </a:extLst>
           </p:cNvPr>
@@ -5197,6 +5996,13 @@
   <p:clrMapOvr>
     <a:masterClrMapping/>
   </p:clrMapOvr>
+  <p:timing>
+    <p:tnLst>
+      <p:par>
+        <p:cTn id="1" dur="indefinite" restart="never" nodeType="tmRoot"/>
+      </p:par>
+    </p:tnLst>
+  </p:timing>
 </p:sld>
 </file>
 
@@ -5222,7 +6028,7 @@
           <p:cNvPr id="2" name="标题 1">
             <a:extLst>
               <a:ext uri="{FF2B5EF4-FFF2-40B4-BE49-F238E27FC236}">
-                <a16:creationId xmlns:a16="http://schemas.microsoft.com/office/drawing/2014/main" id="{1AE4426A-98C0-40E5-B013-36D1D2DB7982}"/>
+                <a16:creationId xmlns="" xmlns:a16="http://schemas.microsoft.com/office/drawing/2014/main" id="{1AE4426A-98C0-40E5-B013-36D1D2DB7982}"/>
               </a:ext>
             </a:extLst>
           </p:cNvPr>
@@ -5251,7 +6057,7 @@
           <p:cNvPr id="8" name="图片 7">
             <a:extLst>
               <a:ext uri="{FF2B5EF4-FFF2-40B4-BE49-F238E27FC236}">
-                <a16:creationId xmlns:a16="http://schemas.microsoft.com/office/drawing/2014/main" id="{4620749D-7A7B-4382-A675-733665C62A15}"/>
+                <a16:creationId xmlns="" xmlns:a16="http://schemas.microsoft.com/office/drawing/2014/main" id="{4620749D-7A7B-4382-A675-733665C62A15}"/>
               </a:ext>
             </a:extLst>
           </p:cNvPr>
@@ -5292,6 +6098,13 @@
   <p:clrMapOvr>
     <a:masterClrMapping/>
   </p:clrMapOvr>
+  <p:timing>
+    <p:tnLst>
+      <p:par>
+        <p:cTn id="1" dur="indefinite" restart="never" nodeType="tmRoot"/>
+      </p:par>
+    </p:tnLst>
+  </p:timing>
 </p:sld>
 </file>
 
@@ -5317,7 +6130,7 @@
           <p:cNvPr id="2" name="标题 1">
             <a:extLst>
               <a:ext uri="{FF2B5EF4-FFF2-40B4-BE49-F238E27FC236}">
-                <a16:creationId xmlns:a16="http://schemas.microsoft.com/office/drawing/2014/main" id="{276163AB-710B-45D2-800D-23E84C64756F}"/>
+                <a16:creationId xmlns="" xmlns:a16="http://schemas.microsoft.com/office/drawing/2014/main" id="{276163AB-710B-45D2-800D-23E84C64756F}"/>
               </a:ext>
             </a:extLst>
           </p:cNvPr>
@@ -5346,7 +6159,7 @@
           <p:cNvPr id="3" name="内容占位符 2">
             <a:extLst>
               <a:ext uri="{FF2B5EF4-FFF2-40B4-BE49-F238E27FC236}">
-                <a16:creationId xmlns:a16="http://schemas.microsoft.com/office/drawing/2014/main" id="{5EEE164E-0E3B-42D3-B4EE-521411BBEBBA}"/>
+                <a16:creationId xmlns="" xmlns:a16="http://schemas.microsoft.com/office/drawing/2014/main" id="{5EEE164E-0E3B-42D3-B4EE-521411BBEBBA}"/>
               </a:ext>
             </a:extLst>
           </p:cNvPr>
@@ -5482,6 +6295,13 @@
   <p:clrMapOvr>
     <a:masterClrMapping/>
   </p:clrMapOvr>
+  <p:timing>
+    <p:tnLst>
+      <p:par>
+        <p:cTn id="1" dur="indefinite" restart="never" nodeType="tmRoot"/>
+      </p:par>
+    </p:tnLst>
+  </p:timing>
 </p:sld>
 </file>
 
@@ -5507,7 +6327,7 @@
           <p:cNvPr id="2" name="标题 1">
             <a:extLst>
               <a:ext uri="{FF2B5EF4-FFF2-40B4-BE49-F238E27FC236}">
-                <a16:creationId xmlns:a16="http://schemas.microsoft.com/office/drawing/2014/main" id="{3EA4957F-C7C7-46D6-ABA3-BFF65D706BAF}"/>
+                <a16:creationId xmlns="" xmlns:a16="http://schemas.microsoft.com/office/drawing/2014/main" id="{3EA4957F-C7C7-46D6-ABA3-BFF65D706BAF}"/>
               </a:ext>
             </a:extLst>
           </p:cNvPr>
@@ -5536,7 +6356,7 @@
           <p:cNvPr id="3" name="内容占位符 2">
             <a:extLst>
               <a:ext uri="{FF2B5EF4-FFF2-40B4-BE49-F238E27FC236}">
-                <a16:creationId xmlns:a16="http://schemas.microsoft.com/office/drawing/2014/main" id="{879C779E-87C6-43C4-A8F3-6C89F5816A3B}"/>
+                <a16:creationId xmlns="" xmlns:a16="http://schemas.microsoft.com/office/drawing/2014/main" id="{879C779E-87C6-43C4-A8F3-6C89F5816A3B}"/>
               </a:ext>
             </a:extLst>
           </p:cNvPr>
@@ -5633,6 +6453,13 @@
   <p:clrMapOvr>
     <a:masterClrMapping/>
   </p:clrMapOvr>
+  <p:timing>
+    <p:tnLst>
+      <p:par>
+        <p:cTn id="1" dur="indefinite" restart="never" nodeType="tmRoot"/>
+      </p:par>
+    </p:tnLst>
+  </p:timing>
 </p:sld>
 </file>
 
@@ -5658,7 +6485,7 @@
           <p:cNvPr id="2" name="标题 1">
             <a:extLst>
               <a:ext uri="{FF2B5EF4-FFF2-40B4-BE49-F238E27FC236}">
-                <a16:creationId xmlns:a16="http://schemas.microsoft.com/office/drawing/2014/main" id="{F3CF548E-D5B9-4A03-9C7D-13D37673D1A8}"/>
+                <a16:creationId xmlns="" xmlns:a16="http://schemas.microsoft.com/office/drawing/2014/main" id="{F3CF548E-D5B9-4A03-9C7D-13D37673D1A8}"/>
               </a:ext>
             </a:extLst>
           </p:cNvPr>
@@ -5687,7 +6514,7 @@
           <p:cNvPr id="3" name="内容占位符 2">
             <a:extLst>
               <a:ext uri="{FF2B5EF4-FFF2-40B4-BE49-F238E27FC236}">
-                <a16:creationId xmlns:a16="http://schemas.microsoft.com/office/drawing/2014/main" id="{933FC007-1190-4825-8AC1-163E0CC88872}"/>
+                <a16:creationId xmlns="" xmlns:a16="http://schemas.microsoft.com/office/drawing/2014/main" id="{933FC007-1190-4825-8AC1-163E0CC88872}"/>
               </a:ext>
             </a:extLst>
           </p:cNvPr>
@@ -5779,6 +6606,13 @@
   <p:clrMapOvr>
     <a:masterClrMapping/>
   </p:clrMapOvr>
+  <p:timing>
+    <p:tnLst>
+      <p:par>
+        <p:cTn id="1" dur="indefinite" restart="never" nodeType="tmRoot"/>
+      </p:par>
+    </p:tnLst>
+  </p:timing>
 </p:sld>
 </file>
 
@@ -5804,7 +6638,7 @@
           <p:cNvPr id="2" name="标题 1">
             <a:extLst>
               <a:ext uri="{FF2B5EF4-FFF2-40B4-BE49-F238E27FC236}">
-                <a16:creationId xmlns:a16="http://schemas.microsoft.com/office/drawing/2014/main" id="{5F310513-360A-4769-ACC1-5D1356BEC09E}"/>
+                <a16:creationId xmlns="" xmlns:a16="http://schemas.microsoft.com/office/drawing/2014/main" id="{5F310513-360A-4769-ACC1-5D1356BEC09E}"/>
               </a:ext>
             </a:extLst>
           </p:cNvPr>
@@ -5833,7 +6667,7 @@
           <p:cNvPr id="3" name="内容占位符 2">
             <a:extLst>
               <a:ext uri="{FF2B5EF4-FFF2-40B4-BE49-F238E27FC236}">
-                <a16:creationId xmlns:a16="http://schemas.microsoft.com/office/drawing/2014/main" id="{5BFA79C6-B76E-4184-9DEC-D06754A4CDFC}"/>
+                <a16:creationId xmlns="" xmlns:a16="http://schemas.microsoft.com/office/drawing/2014/main" id="{5BFA79C6-B76E-4184-9DEC-D06754A4CDFC}"/>
               </a:ext>
             </a:extLst>
           </p:cNvPr>
@@ -5885,6 +6719,13 @@
   <p:clrMapOvr>
     <a:masterClrMapping/>
   </p:clrMapOvr>
+  <p:timing>
+    <p:tnLst>
+      <p:par>
+        <p:cTn id="1" dur="indefinite" restart="never" nodeType="tmRoot"/>
+      </p:par>
+    </p:tnLst>
+  </p:timing>
 </p:sld>
 </file>
 
@@ -5910,7 +6751,7 @@
           <p:cNvPr id="2" name="标题 1">
             <a:extLst>
               <a:ext uri="{FF2B5EF4-FFF2-40B4-BE49-F238E27FC236}">
-                <a16:creationId xmlns:a16="http://schemas.microsoft.com/office/drawing/2014/main" id="{25DE9570-04E8-4F65-A368-F8849186D914}"/>
+                <a16:creationId xmlns="" xmlns:a16="http://schemas.microsoft.com/office/drawing/2014/main" id="{25DE9570-04E8-4F65-A368-F8849186D914}"/>
               </a:ext>
             </a:extLst>
           </p:cNvPr>
@@ -5946,7 +6787,7 @@
           <p:cNvPr id="3" name="内容占位符 2">
             <a:extLst>
               <a:ext uri="{FF2B5EF4-FFF2-40B4-BE49-F238E27FC236}">
-                <a16:creationId xmlns:a16="http://schemas.microsoft.com/office/drawing/2014/main" id="{1E62FFC9-CD8A-45D7-8333-DE6EAB5F6432}"/>
+                <a16:creationId xmlns="" xmlns:a16="http://schemas.microsoft.com/office/drawing/2014/main" id="{1E62FFC9-CD8A-45D7-8333-DE6EAB5F6432}"/>
               </a:ext>
             </a:extLst>
           </p:cNvPr>
@@ -6022,6 +6863,13 @@
   <p:clrMapOvr>
     <a:masterClrMapping/>
   </p:clrMapOvr>
+  <p:timing>
+    <p:tnLst>
+      <p:par>
+        <p:cTn id="1" dur="indefinite" restart="never" nodeType="tmRoot"/>
+      </p:par>
+    </p:tnLst>
+  </p:timing>
 </p:sld>
 </file>
 

</xml_diff>